<commit_message>
Added details for SOLID
</commit_message>
<xml_diff>
--- a/SE_Intro.pptx
+++ b/SE_Intro.pptx
@@ -33,6 +33,11 @@
     <p:sldId id="280" r:id="rId28"/>
     <p:sldId id="281" r:id="rId29"/>
     <p:sldId id="282" r:id="rId30"/>
+    <p:sldId id="283" r:id="rId31"/>
+    <p:sldId id="284" r:id="rId32"/>
+    <p:sldId id="285" r:id="rId33"/>
+    <p:sldId id="286" r:id="rId34"/>
+    <p:sldId id="287" r:id="rId35"/>
   </p:sldIdLst>
   <p:sldSz cx="10080625" cy="7559675"/>
   <p:notesSz cx="7559675" cy="10691812"/>
@@ -2729,7 +2734,7 @@
         <p:spPr>
           <a:xfrm>
             <a:off x="0" y="4320000"/>
-            <a:ext cx="501120" cy="1077120"/>
+            <a:ext cx="500760" cy="1076760"/>
           </a:xfrm>
           <a:prstGeom prst="rect">
             <a:avLst/>
@@ -3008,7 +3013,7 @@
         <p:spPr>
           <a:xfrm>
             <a:off x="0" y="288000"/>
-            <a:ext cx="501120" cy="1077120"/>
+            <a:ext cx="500760" cy="1076760"/>
           </a:xfrm>
           <a:prstGeom prst="rect">
             <a:avLst/>
@@ -3287,7 +3292,7 @@
         <p:spPr>
           <a:xfrm>
             <a:off x="792000" y="3993480"/>
-            <a:ext cx="8565120" cy="1658520"/>
+            <a:ext cx="8564760" cy="1658160"/>
           </a:xfrm>
           <a:prstGeom prst="rect">
             <a:avLst/>
@@ -3338,7 +3343,7 @@
         <p:spPr>
           <a:xfrm>
             <a:off x="792000" y="5904000"/>
-            <a:ext cx="8565120" cy="979560"/>
+            <a:ext cx="8564760" cy="979200"/>
           </a:xfrm>
           <a:prstGeom prst="rect">
             <a:avLst/>
@@ -3413,7 +3418,7 @@
         <p:spPr>
           <a:xfrm>
             <a:off x="720000" y="300960"/>
-            <a:ext cx="8852760" cy="1259640"/>
+            <a:ext cx="8852400" cy="1259280"/>
           </a:xfrm>
           <a:prstGeom prst="rect">
             <a:avLst/>
@@ -3462,7 +3467,7 @@
         <p:spPr>
           <a:xfrm>
             <a:off x="720000" y="2160000"/>
-            <a:ext cx="8637120" cy="4381920"/>
+            <a:ext cx="8636760" cy="4381560"/>
           </a:xfrm>
           <a:prstGeom prst="rect">
             <a:avLst/>
@@ -3481,7 +3486,7 @@
         <p:txBody>
           <a:bodyPr lIns="0" rIns="0" tIns="0" bIns="0"/>
           <a:p>
-            <a:pPr marL="432000" indent="-321120">
+            <a:pPr marL="432000" indent="-320760">
               <a:lnSpc>
                 <a:spcPct val="100000"/>
               </a:lnSpc>
@@ -3510,7 +3515,7 @@
             </a:endParaRPr>
           </a:p>
           <a:p>
-            <a:pPr lvl="1" marL="432000" indent="-216000">
+            <a:pPr lvl="1" marL="432000" indent="-215640">
               <a:lnSpc>
                 <a:spcPct val="100000"/>
               </a:lnSpc>
@@ -3539,7 +3544,7 @@
             </a:endParaRPr>
           </a:p>
           <a:p>
-            <a:pPr lvl="1" marL="432000" indent="-216000">
+            <a:pPr lvl="1" marL="432000" indent="-215640">
               <a:lnSpc>
                 <a:spcPct val="100000"/>
               </a:lnSpc>
@@ -3568,7 +3573,7 @@
             </a:endParaRPr>
           </a:p>
           <a:p>
-            <a:pPr lvl="1" marL="432000" indent="-216000">
+            <a:pPr lvl="1" marL="432000" indent="-215640">
               <a:lnSpc>
                 <a:spcPct val="100000"/>
               </a:lnSpc>
@@ -3633,7 +3638,7 @@
         <p:spPr>
           <a:xfrm>
             <a:off x="465480" y="7040880"/>
-            <a:ext cx="5749560" cy="343800"/>
+            <a:ext cx="5749200" cy="343440"/>
           </a:xfrm>
           <a:prstGeom prst="rect">
             <a:avLst/>
@@ -3731,7 +3736,7 @@
         <p:spPr>
           <a:xfrm>
             <a:off x="720000" y="300960"/>
-            <a:ext cx="8852760" cy="1259640"/>
+            <a:ext cx="8852400" cy="1259280"/>
           </a:xfrm>
           <a:prstGeom prst="rect">
             <a:avLst/>
@@ -3780,7 +3785,7 @@
         <p:spPr>
           <a:xfrm>
             <a:off x="465480" y="7040880"/>
-            <a:ext cx="5749560" cy="343800"/>
+            <a:ext cx="5749200" cy="343440"/>
           </a:xfrm>
           <a:prstGeom prst="rect">
             <a:avLst/>
@@ -3833,7 +3838,7 @@
         <p:spPr>
           <a:xfrm>
             <a:off x="528480" y="1392480"/>
-            <a:ext cx="5686560" cy="5648400"/>
+            <a:ext cx="5686200" cy="5648040"/>
           </a:xfrm>
           <a:prstGeom prst="rect">
             <a:avLst/>
@@ -3845,14 +3850,14 @@
       </p:pic>
       <p:sp>
         <p:nvSpPr>
-          <p:cNvPr id="110" name="TextShape 3"/>
-          <p:cNvSpPr txBox="1"/>
+          <p:cNvPr id="110" name="CustomShape 3"/>
+          <p:cNvSpPr/>
           <p:nvPr/>
         </p:nvSpPr>
         <p:spPr>
           <a:xfrm>
             <a:off x="6224760" y="2468880"/>
-            <a:ext cx="3762000" cy="1626120"/>
+            <a:ext cx="3761640" cy="1625760"/>
           </a:xfrm>
           <a:prstGeom prst="rect">
             <a:avLst/>
@@ -3862,9 +3867,20 @@
             <a:noFill/>
           </a:ln>
         </p:spPr>
+        <p:style>
+          <a:lnRef idx="0"/>
+          <a:fillRef idx="0"/>
+          <a:effectRef idx="0"/>
+          <a:fontRef idx="minor"/>
+        </p:style>
         <p:txBody>
           <a:bodyPr lIns="90000" rIns="90000" tIns="45000" bIns="45000"/>
           <a:p>
+            <a:pPr>
+              <a:lnSpc>
+                <a:spcPct val="100000"/>
+              </a:lnSpc>
+            </a:pPr>
             <a:r>
               <a:rPr b="0" lang="en-SG" sz="1800" spc="-1" strike="noStrike">
                 <a:latin typeface="Arial"/>
@@ -3876,11 +3892,21 @@
             </a:endParaRPr>
           </a:p>
           <a:p>
+            <a:pPr>
+              <a:lnSpc>
+                <a:spcPct val="100000"/>
+              </a:lnSpc>
+            </a:pPr>
             <a:endParaRPr b="0" lang="en-SG" sz="1800" spc="-1" strike="noStrike">
               <a:latin typeface="Arial"/>
             </a:endParaRPr>
           </a:p>
           <a:p>
+            <a:pPr>
+              <a:lnSpc>
+                <a:spcPct val="100000"/>
+              </a:lnSpc>
+            </a:pPr>
             <a:r>
               <a:rPr b="0" lang="en-SG" sz="1800" spc="-1" strike="noStrike">
                 <a:latin typeface="Arial"/>
@@ -3892,6 +3918,11 @@
             </a:endParaRPr>
           </a:p>
           <a:p>
+            <a:pPr>
+              <a:lnSpc>
+                <a:spcPct val="100000"/>
+              </a:lnSpc>
+            </a:pPr>
             <a:r>
               <a:rPr b="0" lang="en-SG" sz="1800" spc="-1" strike="noStrike">
                 <a:latin typeface="Arial"/>
@@ -3903,11 +3934,21 @@
             </a:endParaRPr>
           </a:p>
           <a:p>
+            <a:pPr>
+              <a:lnSpc>
+                <a:spcPct val="100000"/>
+              </a:lnSpc>
+            </a:pPr>
             <a:endParaRPr b="0" lang="en-SG" sz="1800" spc="-1" strike="noStrike">
               <a:latin typeface="Arial"/>
             </a:endParaRPr>
           </a:p>
           <a:p>
+            <a:pPr>
+              <a:lnSpc>
+                <a:spcPct val="100000"/>
+              </a:lnSpc>
+            </a:pPr>
             <a:r>
               <a:rPr b="0" lang="en-SG" sz="1800" spc="-1" strike="noStrike">
                 <a:latin typeface="Arial"/>
@@ -3978,7 +4019,7 @@
         <p:spPr>
           <a:xfrm>
             <a:off x="720000" y="300960"/>
-            <a:ext cx="8852760" cy="1259640"/>
+            <a:ext cx="8852400" cy="1259280"/>
           </a:xfrm>
           <a:prstGeom prst="rect">
             <a:avLst/>
@@ -4027,7 +4068,7 @@
         <p:spPr>
           <a:xfrm>
             <a:off x="465480" y="7040880"/>
-            <a:ext cx="5749560" cy="343800"/>
+            <a:ext cx="5749200" cy="343440"/>
           </a:xfrm>
           <a:prstGeom prst="rect">
             <a:avLst/>
@@ -4080,7 +4121,7 @@
         <p:spPr>
           <a:xfrm>
             <a:off x="274320" y="2062080"/>
-            <a:ext cx="9298440" cy="1778400"/>
+            <a:ext cx="9298080" cy="1778040"/>
           </a:xfrm>
           <a:prstGeom prst="rect">
             <a:avLst/>
@@ -4148,7 +4189,7 @@
         <p:spPr>
           <a:xfrm>
             <a:off x="720000" y="300960"/>
-            <a:ext cx="8852760" cy="1259640"/>
+            <a:ext cx="8852400" cy="1259280"/>
           </a:xfrm>
           <a:prstGeom prst="rect">
             <a:avLst/>
@@ -4197,7 +4238,7 @@
         <p:spPr>
           <a:xfrm>
             <a:off x="465480" y="7040880"/>
-            <a:ext cx="5749560" cy="343800"/>
+            <a:ext cx="5749200" cy="343440"/>
           </a:xfrm>
           <a:prstGeom prst="rect">
             <a:avLst/>
@@ -4250,7 +4291,7 @@
         <p:spPr>
           <a:xfrm>
             <a:off x="375120" y="1560600"/>
-            <a:ext cx="8586000" cy="3941280"/>
+            <a:ext cx="8585640" cy="3940920"/>
           </a:xfrm>
           <a:prstGeom prst="rect">
             <a:avLst/>
@@ -4318,7 +4359,7 @@
         <p:spPr>
           <a:xfrm>
             <a:off x="720000" y="300960"/>
-            <a:ext cx="8852760" cy="1259640"/>
+            <a:ext cx="8852400" cy="1259280"/>
           </a:xfrm>
           <a:prstGeom prst="rect">
             <a:avLst/>
@@ -4367,7 +4408,7 @@
         <p:spPr>
           <a:xfrm>
             <a:off x="465480" y="7040880"/>
-            <a:ext cx="5749560" cy="343800"/>
+            <a:ext cx="5749200" cy="343440"/>
           </a:xfrm>
           <a:prstGeom prst="rect">
             <a:avLst/>
@@ -4420,7 +4461,7 @@
         <p:spPr>
           <a:xfrm>
             <a:off x="375120" y="1560600"/>
-            <a:ext cx="8586000" cy="3941280"/>
+            <a:ext cx="8585640" cy="3940920"/>
           </a:xfrm>
           <a:prstGeom prst="rect">
             <a:avLst/>
@@ -4488,7 +4529,7 @@
         <p:spPr>
           <a:xfrm>
             <a:off x="720000" y="300960"/>
-            <a:ext cx="8852760" cy="1259640"/>
+            <a:ext cx="8852400" cy="1259280"/>
           </a:xfrm>
           <a:prstGeom prst="rect">
             <a:avLst/>
@@ -4537,7 +4578,7 @@
         <p:spPr>
           <a:xfrm>
             <a:off x="465480" y="7040880"/>
-            <a:ext cx="5749560" cy="343800"/>
+            <a:ext cx="5749200" cy="343440"/>
           </a:xfrm>
           <a:prstGeom prst="rect">
             <a:avLst/>
@@ -4590,7 +4631,7 @@
         <p:spPr>
           <a:xfrm>
             <a:off x="365760" y="1920240"/>
-            <a:ext cx="9282960" cy="3317400"/>
+            <a:ext cx="9282600" cy="3317040"/>
           </a:xfrm>
           <a:prstGeom prst="rect">
             <a:avLst/>
@@ -4658,7 +4699,7 @@
         <p:spPr>
           <a:xfrm>
             <a:off x="720000" y="300960"/>
-            <a:ext cx="8852760" cy="1259640"/>
+            <a:ext cx="8852400" cy="1259280"/>
           </a:xfrm>
           <a:prstGeom prst="rect">
             <a:avLst/>
@@ -4707,7 +4748,7 @@
         <p:spPr>
           <a:xfrm>
             <a:off x="465480" y="7040880"/>
-            <a:ext cx="5749560" cy="343800"/>
+            <a:ext cx="5749200" cy="343440"/>
           </a:xfrm>
           <a:prstGeom prst="rect">
             <a:avLst/>
@@ -4737,7 +4778,7 @@
         <p:spPr>
           <a:xfrm>
             <a:off x="1268640" y="2857320"/>
-            <a:ext cx="5772240" cy="2171880"/>
+            <a:ext cx="5771880" cy="2171520"/>
           </a:xfrm>
           <a:prstGeom prst="rect">
             <a:avLst/>
@@ -4805,7 +4846,7 @@
         <p:spPr>
           <a:xfrm>
             <a:off x="792000" y="3993480"/>
-            <a:ext cx="8565120" cy="1658520"/>
+            <a:ext cx="8564760" cy="1658160"/>
           </a:xfrm>
           <a:prstGeom prst="rect">
             <a:avLst/>
@@ -4856,7 +4897,7 @@
         <p:spPr>
           <a:xfrm>
             <a:off x="792000" y="5904000"/>
-            <a:ext cx="8565120" cy="979560"/>
+            <a:ext cx="8564760" cy="979200"/>
           </a:xfrm>
           <a:prstGeom prst="rect">
             <a:avLst/>
@@ -4931,7 +4972,7 @@
         <p:spPr>
           <a:xfrm>
             <a:off x="720000" y="300960"/>
-            <a:ext cx="8852760" cy="1259640"/>
+            <a:ext cx="8852400" cy="1259280"/>
           </a:xfrm>
           <a:prstGeom prst="rect">
             <a:avLst/>
@@ -4980,7 +5021,7 @@
         <p:spPr>
           <a:xfrm>
             <a:off x="720000" y="2160000"/>
-            <a:ext cx="8637120" cy="4381920"/>
+            <a:ext cx="8636760" cy="4381560"/>
           </a:xfrm>
           <a:prstGeom prst="rect">
             <a:avLst/>
@@ -4999,7 +5040,7 @@
         <p:txBody>
           <a:bodyPr lIns="0" rIns="0" tIns="0" bIns="0"/>
           <a:p>
-            <a:pPr marL="432000" indent="-321120">
+            <a:pPr marL="432000" indent="-320760">
               <a:lnSpc>
                 <a:spcPct val="100000"/>
               </a:lnSpc>
@@ -5028,7 +5069,7 @@
             </a:endParaRPr>
           </a:p>
           <a:p>
-            <a:pPr marL="432000" indent="-321120">
+            <a:pPr marL="432000" indent="-320760">
               <a:lnSpc>
                 <a:spcPct val="100000"/>
               </a:lnSpc>
@@ -5057,7 +5098,7 @@
             </a:endParaRPr>
           </a:p>
           <a:p>
-            <a:pPr marL="432000" indent="-321120">
+            <a:pPr marL="432000" indent="-320760">
               <a:lnSpc>
                 <a:spcPct val="100000"/>
               </a:lnSpc>
@@ -5164,7 +5205,7 @@
         <p:spPr>
           <a:xfrm>
             <a:off x="465480" y="7040880"/>
-            <a:ext cx="5749560" cy="343800"/>
+            <a:ext cx="5749200" cy="343440"/>
           </a:xfrm>
           <a:prstGeom prst="rect">
             <a:avLst/>
@@ -5217,7 +5258,7 @@
         <p:spPr>
           <a:xfrm>
             <a:off x="5216040" y="4114800"/>
-            <a:ext cx="2190240" cy="2800080"/>
+            <a:ext cx="2189880" cy="2799720"/>
           </a:xfrm>
           <a:prstGeom prst="rect">
             <a:avLst/>
@@ -5285,7 +5326,7 @@
         <p:spPr>
           <a:xfrm>
             <a:off x="720000" y="300960"/>
-            <a:ext cx="8852760" cy="1259640"/>
+            <a:ext cx="8852400" cy="1259280"/>
           </a:xfrm>
           <a:prstGeom prst="rect">
             <a:avLst/>
@@ -5334,7 +5375,7 @@
         <p:spPr>
           <a:xfrm>
             <a:off x="720000" y="2160000"/>
-            <a:ext cx="8637120" cy="4381920"/>
+            <a:ext cx="8636760" cy="4381560"/>
           </a:xfrm>
           <a:prstGeom prst="rect">
             <a:avLst/>
@@ -5353,7 +5394,7 @@
         <p:txBody>
           <a:bodyPr lIns="0" rIns="0" tIns="0" bIns="0"/>
           <a:p>
-            <a:pPr marL="432000" indent="-321120">
+            <a:pPr marL="432000" indent="-320760">
               <a:lnSpc>
                 <a:spcPct val="100000"/>
               </a:lnSpc>
@@ -5422,7 +5463,7 @@
         <p:spPr>
           <a:xfrm>
             <a:off x="4754880" y="2560320"/>
-            <a:ext cx="4722120" cy="4849560"/>
+            <a:ext cx="4721760" cy="4849200"/>
           </a:xfrm>
           <a:prstGeom prst="rect">
             <a:avLst/>
@@ -5490,7 +5531,7 @@
         <p:spPr>
           <a:xfrm>
             <a:off x="720000" y="300960"/>
-            <a:ext cx="8852760" cy="1259640"/>
+            <a:ext cx="8852400" cy="1259280"/>
           </a:xfrm>
           <a:prstGeom prst="rect">
             <a:avLst/>
@@ -5539,7 +5580,7 @@
         <p:spPr>
           <a:xfrm>
             <a:off x="720000" y="2160000"/>
-            <a:ext cx="8637120" cy="4381920"/>
+            <a:ext cx="8636760" cy="4381560"/>
           </a:xfrm>
           <a:prstGeom prst="rect">
             <a:avLst/>
@@ -5558,7 +5599,7 @@
         <p:txBody>
           <a:bodyPr lIns="0" rIns="0" tIns="0" bIns="0"/>
           <a:p>
-            <a:pPr marL="432000" indent="-321120">
+            <a:pPr marL="432000" indent="-320760">
               <a:lnSpc>
                 <a:spcPct val="100000"/>
               </a:lnSpc>
@@ -5587,7 +5628,7 @@
             </a:endParaRPr>
           </a:p>
           <a:p>
-            <a:pPr marL="432000" indent="-321120">
+            <a:pPr marL="432000" indent="-320760">
               <a:lnSpc>
                 <a:spcPct val="100000"/>
               </a:lnSpc>
@@ -5616,7 +5657,7 @@
             </a:endParaRPr>
           </a:p>
           <a:p>
-            <a:pPr marL="432000" indent="-321120">
+            <a:pPr marL="432000" indent="-320760">
               <a:lnSpc>
                 <a:spcPct val="100000"/>
               </a:lnSpc>
@@ -5645,7 +5686,7 @@
             </a:endParaRPr>
           </a:p>
           <a:p>
-            <a:pPr marL="432000" indent="-321120">
+            <a:pPr marL="432000" indent="-320760">
               <a:lnSpc>
                 <a:spcPct val="100000"/>
               </a:lnSpc>
@@ -5674,7 +5715,7 @@
             </a:endParaRPr>
           </a:p>
           <a:p>
-            <a:pPr marL="432000" indent="-321120">
+            <a:pPr marL="432000" indent="-320760">
               <a:lnSpc>
                 <a:spcPct val="100000"/>
               </a:lnSpc>
@@ -5775,7 +5816,7 @@
         <p:spPr>
           <a:xfrm>
             <a:off x="720000" y="300960"/>
-            <a:ext cx="8852760" cy="1259640"/>
+            <a:ext cx="8852400" cy="1259280"/>
           </a:xfrm>
           <a:prstGeom prst="rect">
             <a:avLst/>
@@ -5824,7 +5865,7 @@
         <p:spPr>
           <a:xfrm>
             <a:off x="720000" y="2160000"/>
-            <a:ext cx="8637120" cy="4381920"/>
+            <a:ext cx="8636760" cy="4381560"/>
           </a:xfrm>
           <a:prstGeom prst="rect">
             <a:avLst/>
@@ -5843,7 +5884,7 @@
         <p:txBody>
           <a:bodyPr lIns="0" rIns="0" tIns="0" bIns="0"/>
           <a:p>
-            <a:pPr marL="432000" indent="-321120">
+            <a:pPr marL="432000" indent="-320760">
               <a:lnSpc>
                 <a:spcPct val="100000"/>
               </a:lnSpc>
@@ -5912,7 +5953,7 @@
         <p:spPr>
           <a:xfrm>
             <a:off x="977400" y="2853720"/>
-            <a:ext cx="3753720" cy="1809360"/>
+            <a:ext cx="3753360" cy="1809000"/>
           </a:xfrm>
           <a:prstGeom prst="rect">
             <a:avLst/>
@@ -5935,7 +5976,7 @@
         <p:spPr>
           <a:xfrm>
             <a:off x="5294160" y="2926080"/>
-            <a:ext cx="3827880" cy="4114440"/>
+            <a:ext cx="3827520" cy="4114080"/>
           </a:xfrm>
           <a:prstGeom prst="rect">
             <a:avLst/>
@@ -6003,7 +6044,7 @@
         <p:spPr>
           <a:xfrm>
             <a:off x="720000" y="300960"/>
-            <a:ext cx="8852760" cy="1259640"/>
+            <a:ext cx="8852400" cy="1259280"/>
           </a:xfrm>
           <a:prstGeom prst="rect">
             <a:avLst/>
@@ -6052,7 +6093,7 @@
         <p:spPr>
           <a:xfrm>
             <a:off x="720000" y="2160000"/>
-            <a:ext cx="8637120" cy="4381920"/>
+            <a:ext cx="8636760" cy="4381560"/>
           </a:xfrm>
           <a:prstGeom prst="rect">
             <a:avLst/>
@@ -6071,7 +6112,7 @@
         <p:txBody>
           <a:bodyPr lIns="0" rIns="0" tIns="0" bIns="0"/>
           <a:p>
-            <a:pPr marL="432000" indent="-321120">
+            <a:pPr marL="432000" indent="-320760">
               <a:lnSpc>
                 <a:spcPct val="100000"/>
               </a:lnSpc>
@@ -6100,7 +6141,7 @@
             </a:endParaRPr>
           </a:p>
           <a:p>
-            <a:pPr lvl="1" marL="432000" indent="-216000">
+            <a:pPr lvl="1" marL="432000" indent="-215640">
               <a:lnSpc>
                 <a:spcPct val="100000"/>
               </a:lnSpc>
@@ -6129,7 +6170,7 @@
             </a:endParaRPr>
           </a:p>
           <a:p>
-            <a:pPr marL="432000" indent="-321120">
+            <a:pPr marL="432000" indent="-320760">
               <a:lnSpc>
                 <a:spcPct val="100000"/>
               </a:lnSpc>
@@ -6158,7 +6199,7 @@
             </a:endParaRPr>
           </a:p>
           <a:p>
-            <a:pPr lvl="1" marL="432000" indent="-216000">
+            <a:pPr lvl="1" marL="432000" indent="-215640">
               <a:lnSpc>
                 <a:spcPct val="100000"/>
               </a:lnSpc>
@@ -6187,7 +6228,7 @@
             </a:endParaRPr>
           </a:p>
           <a:p>
-            <a:pPr lvl="1" marL="432000" indent="-216000">
+            <a:pPr lvl="1" marL="432000" indent="-215640">
               <a:lnSpc>
                 <a:spcPct val="100000"/>
               </a:lnSpc>
@@ -6301,7 +6342,7 @@
         <p:spPr>
           <a:xfrm>
             <a:off x="720000" y="300960"/>
-            <a:ext cx="8852760" cy="1259640"/>
+            <a:ext cx="8852400" cy="1259280"/>
           </a:xfrm>
           <a:prstGeom prst="rect">
             <a:avLst/>
@@ -6350,7 +6391,7 @@
         <p:spPr>
           <a:xfrm>
             <a:off x="720000" y="2160000"/>
-            <a:ext cx="8637120" cy="4381920"/>
+            <a:ext cx="8636760" cy="4381560"/>
           </a:xfrm>
           <a:prstGeom prst="rect">
             <a:avLst/>
@@ -6369,7 +6410,7 @@
         <p:txBody>
           <a:bodyPr lIns="0" rIns="0" tIns="0" bIns="0"/>
           <a:p>
-            <a:pPr marL="432000" indent="-321120">
+            <a:pPr marL="432000" indent="-320760">
               <a:lnSpc>
                 <a:spcPct val="100000"/>
               </a:lnSpc>
@@ -6398,7 +6439,7 @@
             </a:endParaRPr>
           </a:p>
           <a:p>
-            <a:pPr marL="432000" indent="-321120">
+            <a:pPr marL="432000" indent="-320760">
               <a:lnSpc>
                 <a:spcPct val="100000"/>
               </a:lnSpc>
@@ -6427,7 +6468,7 @@
             </a:endParaRPr>
           </a:p>
           <a:p>
-            <a:pPr marL="432000" indent="-321120">
+            <a:pPr marL="432000" indent="-320760">
               <a:lnSpc>
                 <a:spcPct val="100000"/>
               </a:lnSpc>
@@ -6456,7 +6497,7 @@
             </a:endParaRPr>
           </a:p>
           <a:p>
-            <a:pPr marL="432000" indent="-321120">
+            <a:pPr marL="432000" indent="-320760">
               <a:lnSpc>
                 <a:spcPct val="100000"/>
               </a:lnSpc>
@@ -6521,7 +6562,7 @@
         <p:spPr>
           <a:xfrm>
             <a:off x="465480" y="7040880"/>
-            <a:ext cx="5749560" cy="343800"/>
+            <a:ext cx="5749200" cy="343440"/>
           </a:xfrm>
           <a:prstGeom prst="rect">
             <a:avLst/>
@@ -6619,7 +6660,7 @@
         <p:spPr>
           <a:xfrm>
             <a:off x="720000" y="300960"/>
-            <a:ext cx="8852760" cy="1259640"/>
+            <a:ext cx="8852400" cy="1259280"/>
           </a:xfrm>
           <a:prstGeom prst="rect">
             <a:avLst/>
@@ -6668,7 +6709,7 @@
         <p:spPr>
           <a:xfrm>
             <a:off x="720000" y="2160000"/>
-            <a:ext cx="8637120" cy="4381920"/>
+            <a:ext cx="8636760" cy="4381560"/>
           </a:xfrm>
           <a:prstGeom prst="rect">
             <a:avLst/>
@@ -6687,7 +6728,7 @@
         <p:txBody>
           <a:bodyPr lIns="0" rIns="0" tIns="0" bIns="0"/>
           <a:p>
-            <a:pPr marL="432000" indent="-321120">
+            <a:pPr marL="432000" indent="-320760">
               <a:lnSpc>
                 <a:spcPct val="100000"/>
               </a:lnSpc>
@@ -6725,10 +6766,11 @@
               </a:spcBef>
             </a:pPr>
             <a:r>
-              <a:rPr b="0" lang="en-SG" sz="2000" spc="-1" strike="noStrike">
-                <a:solidFill>
-                  <a:srgbClr val="333333"/>
-                </a:solidFill>
+              <a:rPr b="0" lang="en-SG" sz="2000" spc="-1" strike="noStrike" u="sng">
+                <a:solidFill>
+                  <a:srgbClr val="0000ff"/>
+                </a:solidFill>
+                <a:uFillTx/>
                 <a:latin typeface="Noto Sans Regular"/>
                 <a:ea typeface="DejaVu Sans"/>
                 <a:hlinkClick r:id="rId1"/>
@@ -6740,7 +6782,7 @@
             </a:endParaRPr>
           </a:p>
           <a:p>
-            <a:pPr marL="432000" indent="-321120">
+            <a:pPr marL="432000" indent="-320760">
               <a:lnSpc>
                 <a:spcPct val="100000"/>
               </a:lnSpc>
@@ -6769,7 +6811,20 @@
             </a:endParaRPr>
           </a:p>
           <a:p>
-            <a:pPr marL="432000" indent="-321120">
+            <a:pPr>
+              <a:lnSpc>
+                <a:spcPct val="100000"/>
+              </a:lnSpc>
+              <a:spcBef>
+                <a:spcPts val="1417"/>
+              </a:spcBef>
+            </a:pPr>
+            <a:endParaRPr b="0" lang="en-SG" sz="2000" spc="-1" strike="noStrike">
+              <a:latin typeface="Arial"/>
+            </a:endParaRPr>
+          </a:p>
+          <a:p>
+            <a:pPr marL="432000" indent="-320760">
               <a:lnSpc>
                 <a:spcPct val="100000"/>
               </a:lnSpc>
@@ -6783,12 +6838,45 @@
               <a:buFont typeface="Wingdings" charset="2"/>
               <a:buChar char=""/>
             </a:pPr>
-            <a:endParaRPr b="0" lang="en-SG" sz="2000" spc="-1" strike="noStrike">
-              <a:latin typeface="Arial"/>
-            </a:endParaRPr>
-          </a:p>
-          <a:p>
-            <a:pPr marL="432000" indent="-321120">
+            <a:r>
+              <a:rPr b="0" lang="en-SG" sz="2000" spc="-1" strike="noStrike">
+                <a:solidFill>
+                  <a:srgbClr val="333333"/>
+                </a:solidFill>
+                <a:latin typeface="Noto Sans Regular"/>
+                <a:ea typeface="DejaVu Sans"/>
+              </a:rPr>
+              <a:t>Factory – Creational</a:t>
+            </a:r>
+            <a:endParaRPr b="0" lang="en-SG" sz="2000" spc="-1" strike="noStrike">
+              <a:latin typeface="Arial"/>
+            </a:endParaRPr>
+          </a:p>
+          <a:p>
+            <a:pPr>
+              <a:lnSpc>
+                <a:spcPct val="100000"/>
+              </a:lnSpc>
+              <a:spcBef>
+                <a:spcPts val="1417"/>
+              </a:spcBef>
+            </a:pPr>
+            <a:r>
+              <a:rPr b="0" lang="en-SG" sz="2000" spc="-1" strike="noStrike">
+                <a:solidFill>
+                  <a:srgbClr val="333333"/>
+                </a:solidFill>
+                <a:latin typeface="Noto Sans Regular"/>
+                <a:ea typeface="DejaVu Sans"/>
+              </a:rPr>
+              <a:t>https://www.dofactory.com/net/factory-method-design-pattern</a:t>
+            </a:r>
+            <a:endParaRPr b="0" lang="en-SG" sz="2000" spc="-1" strike="noStrike">
+              <a:latin typeface="Arial"/>
+            </a:endParaRPr>
+          </a:p>
+          <a:p>
+            <a:pPr marL="432000" indent="-320760">
               <a:lnSpc>
                 <a:spcPct val="100000"/>
               </a:lnSpc>
@@ -6810,7 +6898,7 @@
                 <a:latin typeface="Noto Sans Regular"/>
                 <a:ea typeface="DejaVu Sans"/>
               </a:rPr>
-              <a:t>Factory – Creational</a:t>
+              <a:t>Observe “Document” class. Its constructor calls CreatePages(), which is the Factory Method implemented as an abstract method, that needs to be overriden by those inheriting from Document.</a:t>
             </a:r>
             <a:endParaRPr b="0" lang="en-SG" sz="2000" spc="-1" strike="noStrike">
               <a:latin typeface="Arial"/>
@@ -6824,64 +6912,6 @@
               <a:spcBef>
                 <a:spcPts val="1417"/>
               </a:spcBef>
-            </a:pPr>
-            <a:r>
-              <a:rPr b="0" lang="en-SG" sz="2000" spc="-1" strike="noStrike">
-                <a:solidFill>
-                  <a:srgbClr val="333333"/>
-                </a:solidFill>
-                <a:latin typeface="Noto Sans Regular"/>
-                <a:ea typeface="DejaVu Sans"/>
-              </a:rPr>
-              <a:t>https://www.dofactory.com/net/factory-method-design-pattern</a:t>
-            </a:r>
-            <a:endParaRPr b="0" lang="en-SG" sz="2000" spc="-1" strike="noStrike">
-              <a:latin typeface="Arial"/>
-            </a:endParaRPr>
-          </a:p>
-          <a:p>
-            <a:pPr marL="432000" indent="-321120">
-              <a:lnSpc>
-                <a:spcPct val="100000"/>
-              </a:lnSpc>
-              <a:spcBef>
-                <a:spcPts val="1417"/>
-              </a:spcBef>
-              <a:buClr>
-                <a:srgbClr val="ef2929"/>
-              </a:buClr>
-              <a:buSzPct val="45000"/>
-              <a:buFont typeface="Wingdings" charset="2"/>
-              <a:buChar char=""/>
-            </a:pPr>
-            <a:r>
-              <a:rPr b="0" lang="en-SG" sz="2000" spc="-1" strike="noStrike">
-                <a:solidFill>
-                  <a:srgbClr val="333333"/>
-                </a:solidFill>
-                <a:latin typeface="Noto Sans Regular"/>
-                <a:ea typeface="DejaVu Sans"/>
-              </a:rPr>
-              <a:t>Observe “Document” class. Its constructor calls CreatePages(), which is the Factory Method implemented as an abstract method, that needs to be overriden by those inheriting from Document.</a:t>
-            </a:r>
-            <a:endParaRPr b="0" lang="en-SG" sz="2000" spc="-1" strike="noStrike">
-              <a:latin typeface="Arial"/>
-            </a:endParaRPr>
-          </a:p>
-          <a:p>
-            <a:pPr marL="432000" indent="-321120">
-              <a:lnSpc>
-                <a:spcPct val="100000"/>
-              </a:lnSpc>
-              <a:spcBef>
-                <a:spcPts val="1417"/>
-              </a:spcBef>
-              <a:buClr>
-                <a:srgbClr val="ef2929"/>
-              </a:buClr>
-              <a:buSzPct val="45000"/>
-              <a:buFont typeface="Wingdings" charset="2"/>
-              <a:buChar char=""/>
             </a:pPr>
             <a:endParaRPr b="0" lang="en-SG" sz="2000" spc="-1" strike="noStrike">
               <a:latin typeface="Arial"/>
@@ -6924,7 +6954,7 @@
         <p:spPr>
           <a:xfrm>
             <a:off x="465480" y="7040880"/>
-            <a:ext cx="5749560" cy="343800"/>
+            <a:ext cx="5749200" cy="343440"/>
           </a:xfrm>
           <a:prstGeom prst="rect">
             <a:avLst/>
@@ -6999,7 +7029,7 @@
         <p:spPr>
           <a:xfrm>
             <a:off x="720000" y="300960"/>
-            <a:ext cx="8852760" cy="1259640"/>
+            <a:ext cx="8852400" cy="1259280"/>
           </a:xfrm>
           <a:prstGeom prst="rect">
             <a:avLst/>
@@ -7048,7 +7078,7 @@
         <p:spPr>
           <a:xfrm>
             <a:off x="720000" y="2160000"/>
-            <a:ext cx="8637120" cy="4381920"/>
+            <a:ext cx="8636760" cy="4381560"/>
           </a:xfrm>
           <a:prstGeom prst="rect">
             <a:avLst/>
@@ -7067,7 +7097,7 @@
         <p:txBody>
           <a:bodyPr lIns="0" rIns="0" tIns="0" bIns="0"/>
           <a:p>
-            <a:pPr marL="432000" indent="-321120">
+            <a:pPr marL="432000" indent="-320760">
               <a:lnSpc>
                 <a:spcPct val="100000"/>
               </a:lnSpc>
@@ -7119,7 +7149,7 @@
             </a:endParaRPr>
           </a:p>
           <a:p>
-            <a:pPr marL="432000" indent="-321120">
+            <a:pPr marL="432000" indent="-320760">
               <a:lnSpc>
                 <a:spcPct val="100000"/>
               </a:lnSpc>
@@ -7148,7 +7178,20 @@
             </a:endParaRPr>
           </a:p>
           <a:p>
-            <a:pPr marL="432000" indent="-321120">
+            <a:pPr>
+              <a:lnSpc>
+                <a:spcPct val="100000"/>
+              </a:lnSpc>
+              <a:spcBef>
+                <a:spcPts val="1417"/>
+              </a:spcBef>
+            </a:pPr>
+            <a:endParaRPr b="0" lang="en-SG" sz="2000" spc="-1" strike="noStrike">
+              <a:latin typeface="Arial"/>
+            </a:endParaRPr>
+          </a:p>
+          <a:p>
+            <a:pPr marL="432000" indent="-320760">
               <a:lnSpc>
                 <a:spcPct val="100000"/>
               </a:lnSpc>
@@ -7162,12 +7205,45 @@
               <a:buFont typeface="Wingdings" charset="2"/>
               <a:buChar char=""/>
             </a:pPr>
-            <a:endParaRPr b="0" lang="en-SG" sz="2000" spc="-1" strike="noStrike">
-              <a:latin typeface="Arial"/>
-            </a:endParaRPr>
-          </a:p>
-          <a:p>
-            <a:pPr marL="432000" indent="-321120">
+            <a:r>
+              <a:rPr b="0" lang="en-SG" sz="2000" spc="-1" strike="noStrike">
+                <a:solidFill>
+                  <a:srgbClr val="333333"/>
+                </a:solidFill>
+                <a:latin typeface="Noto Sans Regular"/>
+                <a:ea typeface="DejaVu Sans"/>
+              </a:rPr>
+              <a:t>Template – Behavioural</a:t>
+            </a:r>
+            <a:endParaRPr b="0" lang="en-SG" sz="2000" spc="-1" strike="noStrike">
+              <a:latin typeface="Arial"/>
+            </a:endParaRPr>
+          </a:p>
+          <a:p>
+            <a:pPr>
+              <a:lnSpc>
+                <a:spcPct val="100000"/>
+              </a:lnSpc>
+              <a:spcBef>
+                <a:spcPts val="1417"/>
+              </a:spcBef>
+            </a:pPr>
+            <a:r>
+              <a:rPr b="0" lang="en-SG" sz="2000" spc="-1" strike="noStrike">
+                <a:solidFill>
+                  <a:srgbClr val="333333"/>
+                </a:solidFill>
+                <a:latin typeface="Noto Sans Regular"/>
+                <a:ea typeface="DejaVu Sans"/>
+              </a:rPr>
+              <a:t>https://www.dofactory.com/net/template-method-design-pattern</a:t>
+            </a:r>
+            <a:endParaRPr b="0" lang="en-SG" sz="2000" spc="-1" strike="noStrike">
+              <a:latin typeface="Arial"/>
+            </a:endParaRPr>
+          </a:p>
+          <a:p>
+            <a:pPr marL="432000" indent="-320760">
               <a:lnSpc>
                 <a:spcPct val="100000"/>
               </a:lnSpc>
@@ -7189,7 +7265,7 @@
                 <a:latin typeface="Noto Sans Regular"/>
                 <a:ea typeface="DejaVu Sans"/>
               </a:rPr>
-              <a:t>Template – Behavioural</a:t>
+              <a:t>Note the ‘Template Method’ Run(). It defines the 4 methods that need to run in this sequence. Note that these are abstract methods within the abstract class. Implementing classes need to override these.</a:t>
             </a:r>
             <a:endParaRPr b="0" lang="en-SG" sz="2000" spc="-1" strike="noStrike">
               <a:latin typeface="Arial"/>
@@ -7203,64 +7279,6 @@
               <a:spcBef>
                 <a:spcPts val="1417"/>
               </a:spcBef>
-            </a:pPr>
-            <a:r>
-              <a:rPr b="0" lang="en-SG" sz="2000" spc="-1" strike="noStrike">
-                <a:solidFill>
-                  <a:srgbClr val="333333"/>
-                </a:solidFill>
-                <a:latin typeface="Noto Sans Regular"/>
-                <a:ea typeface="DejaVu Sans"/>
-              </a:rPr>
-              <a:t>https://www.dofactory.com/net/template-method-design-pattern</a:t>
-            </a:r>
-            <a:endParaRPr b="0" lang="en-SG" sz="2000" spc="-1" strike="noStrike">
-              <a:latin typeface="Arial"/>
-            </a:endParaRPr>
-          </a:p>
-          <a:p>
-            <a:pPr marL="432000" indent="-321120">
-              <a:lnSpc>
-                <a:spcPct val="100000"/>
-              </a:lnSpc>
-              <a:spcBef>
-                <a:spcPts val="1417"/>
-              </a:spcBef>
-              <a:buClr>
-                <a:srgbClr val="ef2929"/>
-              </a:buClr>
-              <a:buSzPct val="45000"/>
-              <a:buFont typeface="Wingdings" charset="2"/>
-              <a:buChar char=""/>
-            </a:pPr>
-            <a:r>
-              <a:rPr b="0" lang="en-SG" sz="2000" spc="-1" strike="noStrike">
-                <a:solidFill>
-                  <a:srgbClr val="333333"/>
-                </a:solidFill>
-                <a:latin typeface="Noto Sans Regular"/>
-                <a:ea typeface="DejaVu Sans"/>
-              </a:rPr>
-              <a:t>Note the ‘Template Method’ Run(). It defines the 4 methods that need to run in this sequence. Note that these are abstract methods within the abstract class. Implementing classes need to override these.</a:t>
-            </a:r>
-            <a:endParaRPr b="0" lang="en-SG" sz="2000" spc="-1" strike="noStrike">
-              <a:latin typeface="Arial"/>
-            </a:endParaRPr>
-          </a:p>
-          <a:p>
-            <a:pPr marL="432000" indent="-321120">
-              <a:lnSpc>
-                <a:spcPct val="100000"/>
-              </a:lnSpc>
-              <a:spcBef>
-                <a:spcPts val="1417"/>
-              </a:spcBef>
-              <a:buClr>
-                <a:srgbClr val="ef2929"/>
-              </a:buClr>
-              <a:buSzPct val="45000"/>
-              <a:buFont typeface="Wingdings" charset="2"/>
-              <a:buChar char=""/>
             </a:pPr>
             <a:endParaRPr b="0" lang="en-SG" sz="2000" spc="-1" strike="noStrike">
               <a:latin typeface="Arial"/>
@@ -7303,7 +7321,7 @@
         <p:spPr>
           <a:xfrm>
             <a:off x="465480" y="7040880"/>
-            <a:ext cx="5749560" cy="343800"/>
+            <a:ext cx="5749200" cy="343440"/>
           </a:xfrm>
           <a:prstGeom prst="rect">
             <a:avLst/>
@@ -7378,7 +7396,7 @@
         <p:spPr>
           <a:xfrm>
             <a:off x="720000" y="300960"/>
-            <a:ext cx="8852760" cy="1259640"/>
+            <a:ext cx="8852400" cy="1259280"/>
           </a:xfrm>
           <a:prstGeom prst="rect">
             <a:avLst/>
@@ -7427,7 +7445,7 @@
         <p:spPr>
           <a:xfrm>
             <a:off x="720000" y="2160000"/>
-            <a:ext cx="8637120" cy="4381920"/>
+            <a:ext cx="8636760" cy="4381560"/>
           </a:xfrm>
           <a:prstGeom prst="rect">
             <a:avLst/>
@@ -7446,7 +7464,7 @@
         <p:txBody>
           <a:bodyPr lIns="0" rIns="0" tIns="0" bIns="0"/>
           <a:p>
-            <a:pPr marL="432000" indent="-321120">
+            <a:pPr marL="432000" indent="-320760">
               <a:lnSpc>
                 <a:spcPct val="100000"/>
               </a:lnSpc>
@@ -7498,7 +7516,7 @@
             </a:endParaRPr>
           </a:p>
           <a:p>
-            <a:pPr marL="432000" indent="-321120">
+            <a:pPr marL="432000" indent="-320760">
               <a:lnSpc>
                 <a:spcPct val="100000"/>
               </a:lnSpc>
@@ -7563,7 +7581,7 @@
         <p:spPr>
           <a:xfrm>
             <a:off x="465480" y="7040880"/>
-            <a:ext cx="5749560" cy="343800"/>
+            <a:ext cx="5749200" cy="343440"/>
           </a:xfrm>
           <a:prstGeom prst="rect">
             <a:avLst/>
@@ -7638,7 +7656,7 @@
         <p:spPr>
           <a:xfrm>
             <a:off x="720000" y="300960"/>
-            <a:ext cx="8852760" cy="1259640"/>
+            <a:ext cx="8852400" cy="1259280"/>
           </a:xfrm>
           <a:prstGeom prst="rect">
             <a:avLst/>
@@ -7687,7 +7705,7 @@
         <p:spPr>
           <a:xfrm>
             <a:off x="720000" y="2160000"/>
-            <a:ext cx="8637120" cy="4381920"/>
+            <a:ext cx="8636760" cy="4381560"/>
           </a:xfrm>
           <a:prstGeom prst="rect">
             <a:avLst/>
@@ -7706,7 +7724,7 @@
         <p:txBody>
           <a:bodyPr lIns="0" rIns="0" tIns="0" bIns="0"/>
           <a:p>
-            <a:pPr marL="432000" indent="-321120">
+            <a:pPr marL="432000" indent="-320760">
               <a:lnSpc>
                 <a:spcPct val="100000"/>
               </a:lnSpc>
@@ -7735,7 +7753,7 @@
             </a:endParaRPr>
           </a:p>
           <a:p>
-            <a:pPr lvl="1" marL="432000" indent="-215280">
+            <a:pPr lvl="1" marL="432000" indent="-214920">
               <a:lnSpc>
                 <a:spcPct val="100000"/>
               </a:lnSpc>
@@ -7764,7 +7782,7 @@
             </a:endParaRPr>
           </a:p>
           <a:p>
-            <a:pPr lvl="1" marL="432000" indent="-215280">
+            <a:pPr lvl="1" marL="432000" indent="-214920">
               <a:lnSpc>
                 <a:spcPct val="100000"/>
               </a:lnSpc>
@@ -7793,7 +7811,7 @@
             </a:endParaRPr>
           </a:p>
           <a:p>
-            <a:pPr lvl="1" marL="432000" indent="-215280">
+            <a:pPr lvl="1" marL="432000" indent="-214920">
               <a:lnSpc>
                 <a:spcPct val="100000"/>
               </a:lnSpc>
@@ -7822,7 +7840,7 @@
             </a:endParaRPr>
           </a:p>
           <a:p>
-            <a:pPr lvl="1" marL="432000" indent="-215280">
+            <a:pPr lvl="1" marL="432000" indent="-214920">
               <a:lnSpc>
                 <a:spcPct val="100000"/>
               </a:lnSpc>
@@ -7851,7 +7869,7 @@
             </a:endParaRPr>
           </a:p>
           <a:p>
-            <a:pPr lvl="1" marL="432000" indent="-215280">
+            <a:pPr lvl="1" marL="432000" indent="-214920">
               <a:lnSpc>
                 <a:spcPct val="100000"/>
               </a:lnSpc>
@@ -7902,55 +7920,6 @@
               </a:spcAft>
             </a:pPr>
             <a:endParaRPr b="0" lang="en-SG" sz="2000" spc="-1" strike="noStrike">
-              <a:latin typeface="Arial"/>
-            </a:endParaRPr>
-          </a:p>
-        </p:txBody>
-      </p:sp>
-      <p:sp>
-        <p:nvSpPr>
-          <p:cNvPr id="155" name="CustomShape 3"/>
-          <p:cNvSpPr/>
-          <p:nvPr/>
-        </p:nvSpPr>
-        <p:spPr>
-          <a:xfrm>
-            <a:off x="465480" y="7040880"/>
-            <a:ext cx="5749560" cy="343800"/>
-          </a:xfrm>
-          <a:prstGeom prst="rect">
-            <a:avLst/>
-          </a:prstGeom>
-          <a:noFill/>
-          <a:ln>
-            <a:noFill/>
-          </a:ln>
-        </p:spPr>
-        <p:style>
-          <a:lnRef idx="0"/>
-          <a:fillRef idx="0"/>
-          <a:effectRef idx="0"/>
-          <a:fontRef idx="minor"/>
-        </p:style>
-        <p:txBody>
-          <a:bodyPr lIns="90000" rIns="90000" tIns="45000" bIns="45000"/>
-          <a:p>
-            <a:pPr>
-              <a:lnSpc>
-                <a:spcPct val="100000"/>
-              </a:lnSpc>
-            </a:pPr>
-            <a:r>
-              <a:rPr b="0" lang="en-SG" sz="1300" spc="-1" strike="noStrike">
-                <a:solidFill>
-                  <a:srgbClr val="000000"/>
-                </a:solidFill>
-                <a:latin typeface="Arial"/>
-                <a:ea typeface="DejaVu Sans"/>
-              </a:rPr>
-              <a:t>https://www.geeksforgeeks.org/introduction-to-net-framework/</a:t>
-            </a:r>
-            <a:endParaRPr b="0" lang="en-SG" sz="1300" spc="-1" strike="noStrike">
               <a:latin typeface="Arial"/>
             </a:endParaRPr>
           </a:p>
@@ -8007,14 +7976,14 @@
       </p:grpSpPr>
       <p:sp>
         <p:nvSpPr>
-          <p:cNvPr id="156" name="CustomShape 1"/>
+          <p:cNvPr id="155" name="CustomShape 1"/>
           <p:cNvSpPr/>
           <p:nvPr/>
         </p:nvSpPr>
         <p:spPr>
           <a:xfrm>
             <a:off x="720000" y="300960"/>
-            <a:ext cx="8852760" cy="1259640"/>
+            <a:ext cx="8852400" cy="1259280"/>
           </a:xfrm>
           <a:prstGeom prst="rect">
             <a:avLst/>
@@ -8038,7 +8007,6 @@
                 <a:spcPct val="100000"/>
               </a:lnSpc>
             </a:pPr>
-            <a:br/>
             <a:r>
               <a:rPr b="1" lang="en-SG" sz="4400" spc="-1" strike="noStrike">
                 <a:solidFill>
@@ -8047,7 +8015,7 @@
                 <a:latin typeface="Noto Sans Regular"/>
                 <a:ea typeface="DejaVu Sans"/>
               </a:rPr>
-              <a:t>References</a:t>
+              <a:t>SOLID</a:t>
             </a:r>
             <a:endParaRPr b="0" lang="en-SG" sz="4400" spc="-1" strike="noStrike">
               <a:latin typeface="Arial"/>
@@ -8057,14 +8025,14 @@
       </p:sp>
       <p:sp>
         <p:nvSpPr>
-          <p:cNvPr id="157" name="CustomShape 2"/>
+          <p:cNvPr id="156" name="CustomShape 2"/>
           <p:cNvSpPr/>
           <p:nvPr/>
         </p:nvSpPr>
         <p:spPr>
           <a:xfrm>
             <a:off x="720000" y="2160000"/>
-            <a:ext cx="8637120" cy="4381920"/>
+            <a:ext cx="8636760" cy="4381560"/>
           </a:xfrm>
           <a:prstGeom prst="rect">
             <a:avLst/>
@@ -8083,7 +8051,7 @@
         <p:txBody>
           <a:bodyPr lIns="0" rIns="0" tIns="0" bIns="0"/>
           <a:p>
-            <a:pPr marL="432000" indent="-321120">
+            <a:pPr marL="432000" indent="-320760">
               <a:lnSpc>
                 <a:spcPct val="100000"/>
               </a:lnSpc>
@@ -8105,38 +8073,14 @@
                 <a:latin typeface="Noto Sans Regular"/>
                 <a:ea typeface="DejaVu Sans"/>
               </a:rPr>
-              <a:t>University of Wisconsin, CSE 403 materials</a:t>
-            </a:r>
-            <a:endParaRPr b="0" lang="en-SG" sz="2000" spc="-1" strike="noStrike">
-              <a:latin typeface="Arial"/>
-            </a:endParaRPr>
-          </a:p>
-          <a:p>
-            <a:pPr>
-              <a:lnSpc>
-                <a:spcPct val="100000"/>
-              </a:lnSpc>
-              <a:spcBef>
-                <a:spcPts val="1417"/>
-              </a:spcBef>
-            </a:pPr>
-            <a:r>
-              <a:rPr b="0" lang="en-SG" sz="2000" spc="-1" strike="noStrike">
-                <a:solidFill>
-                  <a:srgbClr val="333333"/>
-                </a:solidFill>
-                <a:latin typeface="Noto Sans Regular"/>
-                <a:ea typeface="DejaVu Sans"/>
-                <a:hlinkClick r:id="rId1"/>
-              </a:rPr>
-              <a:t>https://courses.cs.washington.edu/courses/cse403/11sp/lectures/</a:t>
-            </a:r>
-            <a:endParaRPr b="0" lang="en-SG" sz="2000" spc="-1" strike="noStrike">
-              <a:latin typeface="Arial"/>
-            </a:endParaRPr>
-          </a:p>
-          <a:p>
-            <a:pPr marL="432000" indent="-321120">
+              <a:t>Single Responsibility Principle (SRP)</a:t>
+            </a:r>
+            <a:endParaRPr b="0" lang="en-SG" sz="2000" spc="-1" strike="noStrike">
+              <a:latin typeface="Arial"/>
+            </a:endParaRPr>
+          </a:p>
+          <a:p>
+            <a:pPr marL="432000" indent="-320760">
               <a:lnSpc>
                 <a:spcPct val="100000"/>
               </a:lnSpc>
@@ -8158,50 +8102,8 @@
                 <a:latin typeface="Noto Sans Regular"/>
                 <a:ea typeface="DejaVu Sans"/>
               </a:rPr>
-              <a:t>Blackboard system/Architecture</a:t>
-            </a:r>
-            <a:endParaRPr b="0" lang="en-SG" sz="2000" spc="-1" strike="noStrike">
-              <a:latin typeface="Arial"/>
-            </a:endParaRPr>
-          </a:p>
-          <a:p>
-            <a:pPr marL="432000" indent="-321120">
-              <a:lnSpc>
-                <a:spcPct val="100000"/>
-              </a:lnSpc>
-              <a:spcBef>
-                <a:spcPts val="1417"/>
-              </a:spcBef>
-              <a:buClr>
-                <a:srgbClr val="ef2929"/>
-              </a:buClr>
-              <a:buSzPct val="45000"/>
-              <a:buFont typeface="Wingdings" charset="2"/>
-              <a:buChar char=""/>
-            </a:pPr>
-            <a:r>
-              <a:rPr b="0" lang="en-SG" sz="2000" spc="-1" strike="noStrike">
-                <a:solidFill>
-                  <a:srgbClr val="333333"/>
-                </a:solidFill>
-                <a:latin typeface="Noto Sans Regular"/>
-                <a:ea typeface="DejaVu Sans"/>
-              </a:rPr>
-              <a:t>https://en.wikipedia.org/wiki/Blackboard_system</a:t>
-            </a:r>
-            <a:endParaRPr b="0" lang="en-SG" sz="2000" spc="-1" strike="noStrike">
-              <a:latin typeface="Arial"/>
-            </a:endParaRPr>
-          </a:p>
-          <a:p>
-            <a:pPr>
-              <a:lnSpc>
-                <a:spcPct val="100000"/>
-              </a:lnSpc>
-              <a:spcBef>
-                <a:spcPts val="1417"/>
-              </a:spcBef>
-            </a:pPr>
+              <a:t>A class should have only one reason to change. </a:t>
+            </a:r>
             <a:endParaRPr b="0" lang="en-SG" sz="2000" spc="-1" strike="noStrike">
               <a:latin typeface="Arial"/>
             </a:endParaRPr>
@@ -8234,55 +8136,29 @@
           </a:p>
         </p:txBody>
       </p:sp>
-      <p:sp>
-        <p:nvSpPr>
-          <p:cNvPr id="158" name="CustomShape 3"/>
-          <p:cNvSpPr/>
+      <p:pic>
+        <p:nvPicPr>
+          <p:cNvPr id="157" name="" descr=""/>
+          <p:cNvPicPr/>
           <p:nvPr/>
-        </p:nvSpPr>
-        <p:spPr>
-          <a:xfrm>
-            <a:off x="465480" y="7040880"/>
-            <a:ext cx="5749560" cy="343800"/>
-          </a:xfrm>
-          <a:prstGeom prst="rect">
-            <a:avLst/>
-          </a:prstGeom>
-          <a:noFill/>
+        </p:nvPicPr>
+        <p:blipFill>
+          <a:blip r:embed="rId1"/>
+          <a:stretch/>
+        </p:blipFill>
+        <p:spPr>
+          <a:xfrm>
+            <a:off x="1062360" y="3358440"/>
+            <a:ext cx="5155560" cy="3591000"/>
+          </a:xfrm>
+          <a:prstGeom prst="rect">
+            <a:avLst/>
+          </a:prstGeom>
           <a:ln>
             <a:noFill/>
           </a:ln>
         </p:spPr>
-        <p:style>
-          <a:lnRef idx="0"/>
-          <a:fillRef idx="0"/>
-          <a:effectRef idx="0"/>
-          <a:fontRef idx="minor"/>
-        </p:style>
-        <p:txBody>
-          <a:bodyPr lIns="90000" rIns="90000" tIns="45000" bIns="45000"/>
-          <a:p>
-            <a:pPr>
-              <a:lnSpc>
-                <a:spcPct val="100000"/>
-              </a:lnSpc>
-            </a:pPr>
-            <a:r>
-              <a:rPr b="0" lang="en-SG" sz="1300" spc="-1" strike="noStrike">
-                <a:solidFill>
-                  <a:srgbClr val="000000"/>
-                </a:solidFill>
-                <a:latin typeface="Arial"/>
-                <a:ea typeface="DejaVu Sans"/>
-              </a:rPr>
-              <a:t>https://www.geeksforgeeks.org/introduction-to-net-framework/</a:t>
-            </a:r>
-            <a:endParaRPr b="0" lang="en-SG" sz="1300" spc="-1" strike="noStrike">
-              <a:latin typeface="Arial"/>
-            </a:endParaRPr>
-          </a:p>
-        </p:txBody>
-      </p:sp>
+      </p:pic>
     </p:spTree>
   </p:cSld>
   <p:timing>
@@ -8292,6 +8168,621 @@
           <p:childTnLst>
             <p:seq>
               <p:cTn id="54" dur="indefinite" nodeType="mainSeq"/>
+              <p:prevCondLst>
+                <p:cond delay="0" evt="onPrev">
+                  <p:tgtEl>
+                    <p:sldTgt/>
+                  </p:tgtEl>
+                </p:cond>
+              </p:prevCondLst>
+              <p:nextCondLst>
+                <p:cond delay="0" evt="onNext">
+                  <p:tgtEl>
+                    <p:sldTgt/>
+                  </p:tgtEl>
+                </p:cond>
+              </p:nextCondLst>
+            </p:seq>
+          </p:childTnLst>
+        </p:cTn>
+      </p:par>
+    </p:tnLst>
+  </p:timing>
+</p:sld>
+</file>
+
+<file path=ppt/slides/slide28.xml><?xml version="1.0" encoding="utf-8"?>
+<p:sld xmlns:a="http://schemas.openxmlformats.org/drawingml/2006/main" xmlns:p="http://schemas.openxmlformats.org/presentationml/2006/main" xmlns:r="http://schemas.openxmlformats.org/officeDocument/2006/relationships" xmlns:p14="http://schemas.microsoft.com/office/powerpoint/2010/main" xmlns:p15="http://schemas.microsoft.com/office/powerpoint/2012/main" xmlns:mc="http://schemas.openxmlformats.org/markup-compatibility/2006">
+  <p:cSld>
+    <p:spTree>
+      <p:nvGrpSpPr>
+        <p:cNvPr id="1" name=""/>
+        <p:cNvGrpSpPr/>
+        <p:nvPr/>
+      </p:nvGrpSpPr>
+      <p:grpSpPr>
+        <a:xfrm>
+          <a:off x="0" y="0"/>
+          <a:ext cx="0" cy="0"/>
+          <a:chOff x="0" y="0"/>
+          <a:chExt cx="0" cy="0"/>
+        </a:xfrm>
+      </p:grpSpPr>
+      <p:sp>
+        <p:nvSpPr>
+          <p:cNvPr id="158" name="CustomShape 1"/>
+          <p:cNvSpPr/>
+          <p:nvPr/>
+        </p:nvSpPr>
+        <p:spPr>
+          <a:xfrm>
+            <a:off x="720000" y="300960"/>
+            <a:ext cx="8852400" cy="1259280"/>
+          </a:xfrm>
+          <a:prstGeom prst="rect">
+            <a:avLst/>
+          </a:prstGeom>
+          <a:noFill/>
+          <a:ln>
+            <a:noFill/>
+          </a:ln>
+        </p:spPr>
+        <p:style>
+          <a:lnRef idx="0"/>
+          <a:fillRef idx="0"/>
+          <a:effectRef idx="0"/>
+          <a:fontRef idx="minor"/>
+        </p:style>
+        <p:txBody>
+          <a:bodyPr lIns="0" rIns="0" tIns="0" bIns="0" anchor="ctr"/>
+          <a:p>
+            <a:pPr>
+              <a:lnSpc>
+                <a:spcPct val="100000"/>
+              </a:lnSpc>
+            </a:pPr>
+            <a:r>
+              <a:rPr b="1" lang="en-SG" sz="4400" spc="-1" strike="noStrike">
+                <a:solidFill>
+                  <a:srgbClr val="333333"/>
+                </a:solidFill>
+                <a:latin typeface="Noto Sans Regular"/>
+                <a:ea typeface="DejaVu Sans"/>
+              </a:rPr>
+              <a:t>SOLID</a:t>
+            </a:r>
+            <a:endParaRPr b="0" lang="en-SG" sz="4400" spc="-1" strike="noStrike">
+              <a:latin typeface="Arial"/>
+            </a:endParaRPr>
+          </a:p>
+        </p:txBody>
+      </p:sp>
+      <p:sp>
+        <p:nvSpPr>
+          <p:cNvPr id="159" name="CustomShape 2"/>
+          <p:cNvSpPr/>
+          <p:nvPr/>
+        </p:nvSpPr>
+        <p:spPr>
+          <a:xfrm>
+            <a:off x="720000" y="2160000"/>
+            <a:ext cx="8636760" cy="4381560"/>
+          </a:xfrm>
+          <a:prstGeom prst="rect">
+            <a:avLst/>
+          </a:prstGeom>
+          <a:noFill/>
+          <a:ln>
+            <a:noFill/>
+          </a:ln>
+        </p:spPr>
+        <p:style>
+          <a:lnRef idx="0"/>
+          <a:fillRef idx="0"/>
+          <a:effectRef idx="0"/>
+          <a:fontRef idx="minor"/>
+        </p:style>
+        <p:txBody>
+          <a:bodyPr lIns="0" rIns="0" tIns="0" bIns="0"/>
+          <a:p>
+            <a:pPr marL="432000" indent="-320760">
+              <a:lnSpc>
+                <a:spcPct val="100000"/>
+              </a:lnSpc>
+              <a:spcBef>
+                <a:spcPts val="1417"/>
+              </a:spcBef>
+              <a:buClr>
+                <a:srgbClr val="ef2929"/>
+              </a:buClr>
+              <a:buSzPct val="45000"/>
+              <a:buFont typeface="Wingdings" charset="2"/>
+              <a:buChar char=""/>
+            </a:pPr>
+            <a:r>
+              <a:rPr b="0" lang="en-SG" sz="2000" spc="-1" strike="noStrike">
+                <a:solidFill>
+                  <a:srgbClr val="333333"/>
+                </a:solidFill>
+                <a:latin typeface="Noto Sans Regular"/>
+                <a:ea typeface="DejaVu Sans"/>
+              </a:rPr>
+              <a:t>A </a:t>
+            </a:r>
+            <a:r>
+              <a:rPr b="0" lang="en-SG" sz="2000" spc="-1" strike="noStrike">
+                <a:solidFill>
+                  <a:srgbClr val="333333"/>
+                </a:solidFill>
+                <a:latin typeface="Noto Sans Regular"/>
+                <a:ea typeface="DejaVu Sans"/>
+              </a:rPr>
+              <a:t>Open-Close Principle</a:t>
+            </a:r>
+            <a:endParaRPr b="0" lang="en-SG" sz="2000" spc="-1" strike="noStrike">
+              <a:latin typeface="Arial"/>
+            </a:endParaRPr>
+          </a:p>
+          <a:p>
+            <a:pPr marL="432000" indent="-320760">
+              <a:lnSpc>
+                <a:spcPct val="100000"/>
+              </a:lnSpc>
+              <a:spcBef>
+                <a:spcPts val="1417"/>
+              </a:spcBef>
+              <a:buClr>
+                <a:srgbClr val="ef2929"/>
+              </a:buClr>
+              <a:buSzPct val="45000"/>
+              <a:buFont typeface="Wingdings" charset="2"/>
+              <a:buChar char=""/>
+            </a:pPr>
+            <a:r>
+              <a:rPr b="0" lang="en-SG" sz="2000" spc="-1" strike="noStrike">
+                <a:solidFill>
+                  <a:srgbClr val="333333"/>
+                </a:solidFill>
+                <a:latin typeface="Noto Sans Regular"/>
+                <a:ea typeface="DejaVu Sans"/>
+              </a:rPr>
+              <a:t>Software entities (classes, modules, functions etc) should be open for extension but closed for modification. </a:t>
+            </a:r>
+            <a:endParaRPr b="0" lang="en-SG" sz="2000" spc="-1" strike="noStrike">
+              <a:latin typeface="Arial"/>
+            </a:endParaRPr>
+          </a:p>
+          <a:p>
+            <a:pPr>
+              <a:lnSpc>
+                <a:spcPct val="100000"/>
+              </a:lnSpc>
+              <a:spcBef>
+                <a:spcPts val="1417"/>
+              </a:spcBef>
+            </a:pPr>
+            <a:endParaRPr b="0" lang="en-SG" sz="2000" spc="-1" strike="noStrike">
+              <a:latin typeface="Arial"/>
+            </a:endParaRPr>
+          </a:p>
+          <a:p>
+            <a:pPr>
+              <a:lnSpc>
+                <a:spcPct val="100000"/>
+              </a:lnSpc>
+              <a:spcAft>
+                <a:spcPts val="1414"/>
+              </a:spcAft>
+            </a:pPr>
+            <a:endParaRPr b="0" lang="en-SG" sz="2000" spc="-1" strike="noStrike">
+              <a:latin typeface="Arial"/>
+            </a:endParaRPr>
+          </a:p>
+        </p:txBody>
+      </p:sp>
+      <p:pic>
+        <p:nvPicPr>
+          <p:cNvPr id="160" name="" descr=""/>
+          <p:cNvPicPr/>
+          <p:nvPr/>
+        </p:nvPicPr>
+        <p:blipFill>
+          <a:blip r:embed="rId1"/>
+          <a:stretch/>
+        </p:blipFill>
+        <p:spPr>
+          <a:xfrm>
+            <a:off x="1097280" y="3621240"/>
+            <a:ext cx="4143240" cy="3419640"/>
+          </a:xfrm>
+          <a:prstGeom prst="rect">
+            <a:avLst/>
+          </a:prstGeom>
+          <a:ln>
+            <a:noFill/>
+          </a:ln>
+        </p:spPr>
+      </p:pic>
+      <p:sp>
+        <p:nvSpPr>
+          <p:cNvPr id="161" name="TextShape 3"/>
+          <p:cNvSpPr txBox="1"/>
+          <p:nvPr/>
+        </p:nvSpPr>
+        <p:spPr>
+          <a:xfrm>
+            <a:off x="5120640" y="3951360"/>
+            <a:ext cx="3108240" cy="346320"/>
+          </a:xfrm>
+          <a:prstGeom prst="rect">
+            <a:avLst/>
+          </a:prstGeom>
+          <a:noFill/>
+          <a:ln>
+            <a:noFill/>
+          </a:ln>
+        </p:spPr>
+        <p:txBody>
+          <a:bodyPr lIns="90000" rIns="90000" tIns="45000" bIns="45000"/>
+          <a:p>
+            <a:r>
+              <a:rPr b="0" lang="en-SG" sz="1800" spc="-1" strike="noStrike">
+                <a:latin typeface="Arial"/>
+              </a:rPr>
+              <a:t>Client is not open and closed</a:t>
+            </a:r>
+            <a:endParaRPr b="0" lang="en-SG" sz="1800" spc="-1" strike="noStrike">
+              <a:latin typeface="Arial"/>
+            </a:endParaRPr>
+          </a:p>
+        </p:txBody>
+      </p:sp>
+      <p:sp>
+        <p:nvSpPr>
+          <p:cNvPr id="162" name="TextShape 4"/>
+          <p:cNvSpPr txBox="1"/>
+          <p:nvPr/>
+        </p:nvSpPr>
+        <p:spPr>
+          <a:xfrm>
+            <a:off x="4114800" y="5140080"/>
+            <a:ext cx="3312720" cy="602280"/>
+          </a:xfrm>
+          <a:prstGeom prst="rect">
+            <a:avLst/>
+          </a:prstGeom>
+          <a:noFill/>
+          <a:ln>
+            <a:noFill/>
+          </a:ln>
+        </p:spPr>
+        <p:txBody>
+          <a:bodyPr lIns="90000" rIns="90000" tIns="45000" bIns="45000"/>
+          <a:p>
+            <a:r>
+              <a:rPr b="0" lang="en-SG" sz="1800" spc="-1" strike="noStrike">
+                <a:latin typeface="Arial"/>
+              </a:rPr>
+              <a:t>Template Method Pattern: </a:t>
+            </a:r>
+            <a:endParaRPr b="0" lang="en-SG" sz="1800" spc="-1" strike="noStrike">
+              <a:latin typeface="Arial"/>
+            </a:endParaRPr>
+          </a:p>
+          <a:p>
+            <a:r>
+              <a:rPr b="0" lang="en-SG" sz="1800" spc="-1" strike="noStrike">
+                <a:latin typeface="Arial"/>
+              </a:rPr>
+              <a:t>Base class is open and closed.</a:t>
+            </a:r>
+            <a:endParaRPr b="0" lang="en-SG" sz="1800" spc="-1" strike="noStrike">
+              <a:latin typeface="Arial"/>
+            </a:endParaRPr>
+          </a:p>
+        </p:txBody>
+      </p:sp>
+    </p:spTree>
+  </p:cSld>
+  <p:timing>
+    <p:tnLst>
+      <p:par>
+        <p:cTn id="55" dur="indefinite" restart="never" nodeType="tmRoot">
+          <p:childTnLst>
+            <p:seq>
+              <p:cTn id="56" dur="indefinite" nodeType="mainSeq"/>
+              <p:prevCondLst>
+                <p:cond delay="0" evt="onPrev">
+                  <p:tgtEl>
+                    <p:sldTgt/>
+                  </p:tgtEl>
+                </p:cond>
+              </p:prevCondLst>
+              <p:nextCondLst>
+                <p:cond delay="0" evt="onNext">
+                  <p:tgtEl>
+                    <p:sldTgt/>
+                  </p:tgtEl>
+                </p:cond>
+              </p:nextCondLst>
+            </p:seq>
+          </p:childTnLst>
+        </p:cTn>
+      </p:par>
+    </p:tnLst>
+  </p:timing>
+</p:sld>
+</file>
+
+<file path=ppt/slides/slide29.xml><?xml version="1.0" encoding="utf-8"?>
+<p:sld xmlns:a="http://schemas.openxmlformats.org/drawingml/2006/main" xmlns:p="http://schemas.openxmlformats.org/presentationml/2006/main" xmlns:r="http://schemas.openxmlformats.org/officeDocument/2006/relationships" xmlns:p14="http://schemas.microsoft.com/office/powerpoint/2010/main" xmlns:p15="http://schemas.microsoft.com/office/powerpoint/2012/main" xmlns:mc="http://schemas.openxmlformats.org/markup-compatibility/2006">
+  <p:cSld>
+    <p:spTree>
+      <p:nvGrpSpPr>
+        <p:cNvPr id="1" name=""/>
+        <p:cNvGrpSpPr/>
+        <p:nvPr/>
+      </p:nvGrpSpPr>
+      <p:grpSpPr>
+        <a:xfrm>
+          <a:off x="0" y="0"/>
+          <a:ext cx="0" cy="0"/>
+          <a:chOff x="0" y="0"/>
+          <a:chExt cx="0" cy="0"/>
+        </a:xfrm>
+      </p:grpSpPr>
+      <p:sp>
+        <p:nvSpPr>
+          <p:cNvPr id="163" name="CustomShape 1"/>
+          <p:cNvSpPr/>
+          <p:nvPr/>
+        </p:nvSpPr>
+        <p:spPr>
+          <a:xfrm>
+            <a:off x="720000" y="300960"/>
+            <a:ext cx="8852400" cy="1259280"/>
+          </a:xfrm>
+          <a:prstGeom prst="rect">
+            <a:avLst/>
+          </a:prstGeom>
+          <a:noFill/>
+          <a:ln>
+            <a:noFill/>
+          </a:ln>
+        </p:spPr>
+        <p:style>
+          <a:lnRef idx="0"/>
+          <a:fillRef idx="0"/>
+          <a:effectRef idx="0"/>
+          <a:fontRef idx="minor"/>
+        </p:style>
+        <p:txBody>
+          <a:bodyPr lIns="0" rIns="0" tIns="0" bIns="0" anchor="ctr"/>
+          <a:p>
+            <a:pPr>
+              <a:lnSpc>
+                <a:spcPct val="100000"/>
+              </a:lnSpc>
+            </a:pPr>
+            <a:r>
+              <a:rPr b="1" lang="en-SG" sz="4400" spc="-1" strike="noStrike">
+                <a:solidFill>
+                  <a:srgbClr val="333333"/>
+                </a:solidFill>
+                <a:latin typeface="Noto Sans Regular"/>
+                <a:ea typeface="DejaVu Sans"/>
+              </a:rPr>
+              <a:t>SOLID</a:t>
+            </a:r>
+            <a:endParaRPr b="0" lang="en-SG" sz="4400" spc="-1" strike="noStrike">
+              <a:latin typeface="Arial"/>
+            </a:endParaRPr>
+          </a:p>
+        </p:txBody>
+      </p:sp>
+      <p:sp>
+        <p:nvSpPr>
+          <p:cNvPr id="164" name="CustomShape 2"/>
+          <p:cNvSpPr/>
+          <p:nvPr/>
+        </p:nvSpPr>
+        <p:spPr>
+          <a:xfrm>
+            <a:off x="720000" y="2160000"/>
+            <a:ext cx="5406480" cy="4381560"/>
+          </a:xfrm>
+          <a:prstGeom prst="rect">
+            <a:avLst/>
+          </a:prstGeom>
+          <a:noFill/>
+          <a:ln>
+            <a:noFill/>
+          </a:ln>
+        </p:spPr>
+        <p:style>
+          <a:lnRef idx="0"/>
+          <a:fillRef idx="0"/>
+          <a:effectRef idx="0"/>
+          <a:fontRef idx="minor"/>
+        </p:style>
+        <p:txBody>
+          <a:bodyPr lIns="0" rIns="0" tIns="0" bIns="0"/>
+          <a:p>
+            <a:pPr marL="432000" indent="-320760">
+              <a:lnSpc>
+                <a:spcPct val="100000"/>
+              </a:lnSpc>
+              <a:spcBef>
+                <a:spcPts val="1417"/>
+              </a:spcBef>
+              <a:buClr>
+                <a:srgbClr val="ef2929"/>
+              </a:buClr>
+              <a:buSzPct val="45000"/>
+              <a:buFont typeface="Wingdings" charset="2"/>
+              <a:buChar char=""/>
+            </a:pPr>
+            <a:r>
+              <a:rPr b="0" lang="en-SG" sz="2000" spc="-1" strike="noStrike">
+                <a:solidFill>
+                  <a:srgbClr val="333333"/>
+                </a:solidFill>
+                <a:latin typeface="Noto Sans Regular"/>
+                <a:ea typeface="DejaVu Sans"/>
+              </a:rPr>
+              <a:t>Liskov Substitution Principle</a:t>
+            </a:r>
+            <a:endParaRPr b="0" lang="en-SG" sz="2000" spc="-1" strike="noStrike">
+              <a:latin typeface="Arial"/>
+            </a:endParaRPr>
+          </a:p>
+          <a:p>
+            <a:pPr marL="432000" indent="-320760">
+              <a:lnSpc>
+                <a:spcPct val="100000"/>
+              </a:lnSpc>
+              <a:spcBef>
+                <a:spcPts val="1417"/>
+              </a:spcBef>
+              <a:buClr>
+                <a:srgbClr val="ef2929"/>
+              </a:buClr>
+              <a:buSzPct val="45000"/>
+              <a:buFont typeface="Wingdings" charset="2"/>
+              <a:buChar char=""/>
+            </a:pPr>
+            <a:r>
+              <a:rPr b="0" lang="en-SG" sz="2000" spc="-1" strike="noStrike">
+                <a:solidFill>
+                  <a:srgbClr val="333333"/>
+                </a:solidFill>
+                <a:latin typeface="Noto Sans Regular"/>
+                <a:ea typeface="DejaVu Sans"/>
+              </a:rPr>
+              <a:t>Subtypes must be substitutable for their base types</a:t>
+            </a:r>
+            <a:endParaRPr b="0" lang="en-SG" sz="2000" spc="-1" strike="noStrike">
+              <a:latin typeface="Arial"/>
+            </a:endParaRPr>
+          </a:p>
+          <a:p>
+            <a:pPr marL="432000" indent="-320760">
+              <a:lnSpc>
+                <a:spcPct val="100000"/>
+              </a:lnSpc>
+              <a:spcBef>
+                <a:spcPts val="1417"/>
+              </a:spcBef>
+              <a:buClr>
+                <a:srgbClr val="ef2929"/>
+              </a:buClr>
+              <a:buSzPct val="45000"/>
+              <a:buFont typeface="Wingdings" charset="2"/>
+              <a:buChar char=""/>
+            </a:pPr>
+            <a:r>
+              <a:rPr b="0" lang="en-SG" sz="2000" spc="-1" strike="noStrike">
+                <a:solidFill>
+                  <a:srgbClr val="333333"/>
+                </a:solidFill>
+                <a:latin typeface="Noto Sans Regular"/>
+                <a:ea typeface="DejaVu Sans"/>
+              </a:rPr>
+              <a:t>Violation often results in the use of Run-Time Type Information</a:t>
+            </a:r>
+            <a:endParaRPr b="0" lang="en-SG" sz="2000" spc="-1" strike="noStrike">
+              <a:latin typeface="Arial"/>
+            </a:endParaRPr>
+          </a:p>
+          <a:p>
+            <a:pPr marL="432000" indent="-320760">
+              <a:lnSpc>
+                <a:spcPct val="100000"/>
+              </a:lnSpc>
+              <a:spcBef>
+                <a:spcPts val="1417"/>
+              </a:spcBef>
+              <a:buClr>
+                <a:srgbClr val="ef2929"/>
+              </a:buClr>
+              <a:buSzPct val="45000"/>
+              <a:buFont typeface="Wingdings" charset="2"/>
+              <a:buChar char=""/>
+            </a:pPr>
+            <a:r>
+              <a:rPr b="0" lang="en-SG" sz="2000" spc="-1" strike="noStrike">
+                <a:solidFill>
+                  <a:srgbClr val="333333"/>
+                </a:solidFill>
+                <a:latin typeface="Noto Sans Regular"/>
+                <a:ea typeface="DejaVu Sans"/>
+              </a:rPr>
+              <a:t>if/else used to determine type of object and behaviour</a:t>
+            </a:r>
+            <a:endParaRPr b="0" lang="en-SG" sz="2000" spc="-1" strike="noStrike">
+              <a:latin typeface="Arial"/>
+            </a:endParaRPr>
+          </a:p>
+          <a:p>
+            <a:pPr>
+              <a:lnSpc>
+                <a:spcPct val="100000"/>
+              </a:lnSpc>
+              <a:spcBef>
+                <a:spcPts val="1417"/>
+              </a:spcBef>
+            </a:pPr>
+            <a:endParaRPr b="0" lang="en-SG" sz="2000" spc="-1" strike="noStrike">
+              <a:latin typeface="Arial"/>
+            </a:endParaRPr>
+          </a:p>
+          <a:p>
+            <a:pPr>
+              <a:lnSpc>
+                <a:spcPct val="100000"/>
+              </a:lnSpc>
+              <a:spcAft>
+                <a:spcPts val="1414"/>
+              </a:spcAft>
+            </a:pPr>
+            <a:endParaRPr b="0" lang="en-SG" sz="2000" spc="-1" strike="noStrike">
+              <a:latin typeface="Arial"/>
+            </a:endParaRPr>
+          </a:p>
+        </p:txBody>
+      </p:sp>
+      <p:pic>
+        <p:nvPicPr>
+          <p:cNvPr id="165" name="" descr=""/>
+          <p:cNvPicPr/>
+          <p:nvPr/>
+        </p:nvPicPr>
+        <p:blipFill>
+          <a:blip r:embed="rId1"/>
+          <a:stretch/>
+        </p:blipFill>
+        <p:spPr>
+          <a:xfrm>
+            <a:off x="6949440" y="2341080"/>
+            <a:ext cx="2162160" cy="3876840"/>
+          </a:xfrm>
+          <a:prstGeom prst="rect">
+            <a:avLst/>
+          </a:prstGeom>
+          <a:ln>
+            <a:noFill/>
+          </a:ln>
+        </p:spPr>
+      </p:pic>
+    </p:spTree>
+  </p:cSld>
+  <p:timing>
+    <p:tnLst>
+      <p:par>
+        <p:cTn id="57" dur="indefinite" restart="never" nodeType="tmRoot">
+          <p:childTnLst>
+            <p:seq>
+              <p:cTn id="58" dur="indefinite" nodeType="mainSeq"/>
               <p:prevCondLst>
                 <p:cond delay="0" evt="onPrev">
                   <p:tgtEl>
@@ -8341,7 +8832,7 @@
         <p:spPr>
           <a:xfrm>
             <a:off x="720000" y="300960"/>
-            <a:ext cx="8852760" cy="1259640"/>
+            <a:ext cx="8852400" cy="1259280"/>
           </a:xfrm>
           <a:prstGeom prst="rect">
             <a:avLst/>
@@ -8390,7 +8881,7 @@
         <p:spPr>
           <a:xfrm>
             <a:off x="720000" y="2160000"/>
-            <a:ext cx="8637120" cy="4381920"/>
+            <a:ext cx="8636760" cy="4381560"/>
           </a:xfrm>
           <a:prstGeom prst="rect">
             <a:avLst/>
@@ -8409,7 +8900,7 @@
         <p:txBody>
           <a:bodyPr lIns="0" rIns="0" tIns="0" bIns="0"/>
           <a:p>
-            <a:pPr marL="432000" indent="-321120">
+            <a:pPr marL="432000" indent="-320760">
               <a:lnSpc>
                 <a:spcPct val="100000"/>
               </a:lnSpc>
@@ -8438,7 +8929,7 @@
             </a:endParaRPr>
           </a:p>
           <a:p>
-            <a:pPr marL="432000" indent="-321120">
+            <a:pPr marL="432000" indent="-320760">
               <a:lnSpc>
                 <a:spcPct val="100000"/>
               </a:lnSpc>
@@ -8467,7 +8958,7 @@
             </a:endParaRPr>
           </a:p>
           <a:p>
-            <a:pPr marL="432000" indent="-321120">
+            <a:pPr marL="432000" indent="-320760">
               <a:lnSpc>
                 <a:spcPct val="100000"/>
               </a:lnSpc>
@@ -8496,7 +8987,7 @@
             </a:endParaRPr>
           </a:p>
           <a:p>
-            <a:pPr marL="432000" indent="-321120">
+            <a:pPr marL="432000" indent="-320760">
               <a:lnSpc>
                 <a:spcPct val="100000"/>
               </a:lnSpc>
@@ -8525,7 +9016,7 @@
             </a:endParaRPr>
           </a:p>
           <a:p>
-            <a:pPr marL="432000" indent="-321120">
+            <a:pPr marL="432000" indent="-320760">
               <a:lnSpc>
                 <a:spcPct val="100000"/>
               </a:lnSpc>
@@ -8554,7 +9045,7 @@
             </a:endParaRPr>
           </a:p>
           <a:p>
-            <a:pPr lvl="1" marL="432000" indent="-216000">
+            <a:pPr lvl="1" marL="432000" indent="-215640">
               <a:lnSpc>
                 <a:spcPct val="100000"/>
               </a:lnSpc>
@@ -8583,7 +9074,7 @@
             </a:endParaRPr>
           </a:p>
           <a:p>
-            <a:pPr lvl="1" marL="432000" indent="-216000">
+            <a:pPr lvl="1" marL="432000" indent="-215640">
               <a:lnSpc>
                 <a:spcPct val="100000"/>
               </a:lnSpc>
@@ -8612,7 +9103,7 @@
             </a:endParaRPr>
           </a:p>
           <a:p>
-            <a:pPr lvl="1" marL="432000" indent="-216000">
+            <a:pPr lvl="1" marL="432000" indent="-215640">
               <a:lnSpc>
                 <a:spcPct val="100000"/>
               </a:lnSpc>
@@ -8690,7 +9181,7 @@
         <p:spPr>
           <a:xfrm>
             <a:off x="465480" y="7040880"/>
-            <a:ext cx="5749560" cy="343800"/>
+            <a:ext cx="5749200" cy="343440"/>
           </a:xfrm>
           <a:prstGeom prst="rect">
             <a:avLst/>
@@ -8716,6 +9207,930 @@
           <p:childTnLst>
             <p:seq>
               <p:cTn id="6" dur="indefinite" nodeType="mainSeq"/>
+              <p:prevCondLst>
+                <p:cond delay="0" evt="onPrev">
+                  <p:tgtEl>
+                    <p:sldTgt/>
+                  </p:tgtEl>
+                </p:cond>
+              </p:prevCondLst>
+              <p:nextCondLst>
+                <p:cond delay="0" evt="onNext">
+                  <p:tgtEl>
+                    <p:sldTgt/>
+                  </p:tgtEl>
+                </p:cond>
+              </p:nextCondLst>
+            </p:seq>
+          </p:childTnLst>
+        </p:cTn>
+      </p:par>
+    </p:tnLst>
+  </p:timing>
+</p:sld>
+</file>
+
+<file path=ppt/slides/slide30.xml><?xml version="1.0" encoding="utf-8"?>
+<p:sld xmlns:a="http://schemas.openxmlformats.org/drawingml/2006/main" xmlns:p="http://schemas.openxmlformats.org/presentationml/2006/main" xmlns:r="http://schemas.openxmlformats.org/officeDocument/2006/relationships" xmlns:p14="http://schemas.microsoft.com/office/powerpoint/2010/main" xmlns:p15="http://schemas.microsoft.com/office/powerpoint/2012/main" xmlns:mc="http://schemas.openxmlformats.org/markup-compatibility/2006">
+  <p:cSld>
+    <p:spTree>
+      <p:nvGrpSpPr>
+        <p:cNvPr id="1" name=""/>
+        <p:cNvGrpSpPr/>
+        <p:nvPr/>
+      </p:nvGrpSpPr>
+      <p:grpSpPr>
+        <a:xfrm>
+          <a:off x="0" y="0"/>
+          <a:ext cx="0" cy="0"/>
+          <a:chOff x="0" y="0"/>
+          <a:chExt cx="0" cy="0"/>
+        </a:xfrm>
+      </p:grpSpPr>
+      <p:sp>
+        <p:nvSpPr>
+          <p:cNvPr id="166" name="CustomShape 1"/>
+          <p:cNvSpPr/>
+          <p:nvPr/>
+        </p:nvSpPr>
+        <p:spPr>
+          <a:xfrm>
+            <a:off x="720000" y="300960"/>
+            <a:ext cx="8852400" cy="1259280"/>
+          </a:xfrm>
+          <a:prstGeom prst="rect">
+            <a:avLst/>
+          </a:prstGeom>
+          <a:noFill/>
+          <a:ln>
+            <a:noFill/>
+          </a:ln>
+        </p:spPr>
+        <p:style>
+          <a:lnRef idx="0"/>
+          <a:fillRef idx="0"/>
+          <a:effectRef idx="0"/>
+          <a:fontRef idx="minor"/>
+        </p:style>
+        <p:txBody>
+          <a:bodyPr lIns="0" rIns="0" tIns="0" bIns="0" anchor="ctr"/>
+          <a:p>
+            <a:pPr>
+              <a:lnSpc>
+                <a:spcPct val="100000"/>
+              </a:lnSpc>
+            </a:pPr>
+            <a:r>
+              <a:rPr b="1" lang="en-SG" sz="4400" spc="-1" strike="noStrike">
+                <a:solidFill>
+                  <a:srgbClr val="333333"/>
+                </a:solidFill>
+                <a:latin typeface="Noto Sans Regular"/>
+                <a:ea typeface="DejaVu Sans"/>
+              </a:rPr>
+              <a:t>SOLID</a:t>
+            </a:r>
+            <a:endParaRPr b="0" lang="en-SG" sz="4400" spc="-1" strike="noStrike">
+              <a:latin typeface="Arial"/>
+            </a:endParaRPr>
+          </a:p>
+        </p:txBody>
+      </p:sp>
+      <p:sp>
+        <p:nvSpPr>
+          <p:cNvPr id="167" name="CustomShape 2"/>
+          <p:cNvSpPr/>
+          <p:nvPr/>
+        </p:nvSpPr>
+        <p:spPr>
+          <a:xfrm>
+            <a:off x="720000" y="2160000"/>
+            <a:ext cx="8636760" cy="4381560"/>
+          </a:xfrm>
+          <a:prstGeom prst="rect">
+            <a:avLst/>
+          </a:prstGeom>
+          <a:noFill/>
+          <a:ln>
+            <a:noFill/>
+          </a:ln>
+        </p:spPr>
+        <p:style>
+          <a:lnRef idx="0"/>
+          <a:fillRef idx="0"/>
+          <a:effectRef idx="0"/>
+          <a:fontRef idx="minor"/>
+        </p:style>
+        <p:txBody>
+          <a:bodyPr lIns="0" rIns="0" tIns="0" bIns="0"/>
+          <a:p>
+            <a:pPr marL="432000" indent="-320760">
+              <a:lnSpc>
+                <a:spcPct val="100000"/>
+              </a:lnSpc>
+              <a:spcBef>
+                <a:spcPts val="1417"/>
+              </a:spcBef>
+              <a:buClr>
+                <a:srgbClr val="ef2929"/>
+              </a:buClr>
+              <a:buSzPct val="45000"/>
+              <a:buFont typeface="Wingdings" charset="2"/>
+              <a:buChar char=""/>
+            </a:pPr>
+            <a:r>
+              <a:rPr b="0" lang="en-SG" sz="2000" spc="-1" strike="noStrike">
+                <a:solidFill>
+                  <a:srgbClr val="333333"/>
+                </a:solidFill>
+                <a:latin typeface="Noto Sans Regular"/>
+                <a:ea typeface="DejaVu Sans"/>
+              </a:rPr>
+              <a:t>Interface Segregaton Principle</a:t>
+            </a:r>
+            <a:endParaRPr b="0" lang="en-SG" sz="2000" spc="-1" strike="noStrike">
+              <a:latin typeface="Arial"/>
+            </a:endParaRPr>
+          </a:p>
+          <a:p>
+            <a:pPr marL="432000" indent="-320760">
+              <a:lnSpc>
+                <a:spcPct val="100000"/>
+              </a:lnSpc>
+              <a:spcBef>
+                <a:spcPts val="1417"/>
+              </a:spcBef>
+              <a:buClr>
+                <a:srgbClr val="ef2929"/>
+              </a:buClr>
+              <a:buSzPct val="45000"/>
+              <a:buFont typeface="Wingdings" charset="2"/>
+              <a:buChar char=""/>
+            </a:pPr>
+            <a:r>
+              <a:rPr b="0" lang="en-SG" sz="2000" spc="-1" strike="noStrike">
+                <a:solidFill>
+                  <a:srgbClr val="333333"/>
+                </a:solidFill>
+                <a:latin typeface="Noto Sans Regular"/>
+                <a:ea typeface="DejaVu Sans"/>
+              </a:rPr>
+              <a:t>Disadvantages of “fat” interfaces – classes whose interfaces are not cohesive.</a:t>
+            </a:r>
+            <a:endParaRPr b="0" lang="en-SG" sz="2000" spc="-1" strike="noStrike">
+              <a:latin typeface="Arial"/>
+            </a:endParaRPr>
+          </a:p>
+          <a:p>
+            <a:pPr marL="432000" indent="-320760">
+              <a:lnSpc>
+                <a:spcPct val="100000"/>
+              </a:lnSpc>
+              <a:spcBef>
+                <a:spcPts val="1417"/>
+              </a:spcBef>
+              <a:buClr>
+                <a:srgbClr val="ef2929"/>
+              </a:buClr>
+              <a:buSzPct val="45000"/>
+              <a:buFont typeface="Wingdings" charset="2"/>
+              <a:buChar char=""/>
+            </a:pPr>
+            <a:r>
+              <a:rPr b="0" lang="en-SG" sz="2000" spc="-1" strike="noStrike">
+                <a:solidFill>
+                  <a:srgbClr val="333333"/>
+                </a:solidFill>
+                <a:latin typeface="Noto Sans Regular"/>
+                <a:ea typeface="DejaVu Sans"/>
+              </a:rPr>
+              <a:t>Interfaces of the class can be broke up into groups of methods.</a:t>
+            </a:r>
+            <a:endParaRPr b="0" lang="en-SG" sz="2000" spc="-1" strike="noStrike">
+              <a:latin typeface="Arial"/>
+            </a:endParaRPr>
+          </a:p>
+          <a:p>
+            <a:pPr>
+              <a:lnSpc>
+                <a:spcPct val="100000"/>
+              </a:lnSpc>
+              <a:spcBef>
+                <a:spcPts val="1417"/>
+              </a:spcBef>
+            </a:pPr>
+            <a:endParaRPr b="0" lang="en-SG" sz="2000" spc="-1" strike="noStrike">
+              <a:latin typeface="Arial"/>
+            </a:endParaRPr>
+          </a:p>
+          <a:p>
+            <a:pPr>
+              <a:lnSpc>
+                <a:spcPct val="100000"/>
+              </a:lnSpc>
+              <a:spcAft>
+                <a:spcPts val="1414"/>
+              </a:spcAft>
+            </a:pPr>
+            <a:endParaRPr b="0" lang="en-SG" sz="2000" spc="-1" strike="noStrike">
+              <a:latin typeface="Arial"/>
+            </a:endParaRPr>
+          </a:p>
+        </p:txBody>
+      </p:sp>
+    </p:spTree>
+  </p:cSld>
+  <p:timing>
+    <p:tnLst>
+      <p:par>
+        <p:cTn id="59" dur="indefinite" restart="never" nodeType="tmRoot">
+          <p:childTnLst>
+            <p:seq>
+              <p:cTn id="60" dur="indefinite" nodeType="mainSeq"/>
+              <p:prevCondLst>
+                <p:cond delay="0" evt="onPrev">
+                  <p:tgtEl>
+                    <p:sldTgt/>
+                  </p:tgtEl>
+                </p:cond>
+              </p:prevCondLst>
+              <p:nextCondLst>
+                <p:cond delay="0" evt="onNext">
+                  <p:tgtEl>
+                    <p:sldTgt/>
+                  </p:tgtEl>
+                </p:cond>
+              </p:nextCondLst>
+            </p:seq>
+          </p:childTnLst>
+        </p:cTn>
+      </p:par>
+    </p:tnLst>
+  </p:timing>
+</p:sld>
+</file>
+
+<file path=ppt/slides/slide31.xml><?xml version="1.0" encoding="utf-8"?>
+<p:sld xmlns:a="http://schemas.openxmlformats.org/drawingml/2006/main" xmlns:p="http://schemas.openxmlformats.org/presentationml/2006/main" xmlns:r="http://schemas.openxmlformats.org/officeDocument/2006/relationships" xmlns:p14="http://schemas.microsoft.com/office/powerpoint/2010/main" xmlns:p15="http://schemas.microsoft.com/office/powerpoint/2012/main" xmlns:mc="http://schemas.openxmlformats.org/markup-compatibility/2006">
+  <p:cSld>
+    <p:spTree>
+      <p:nvGrpSpPr>
+        <p:cNvPr id="1" name=""/>
+        <p:cNvGrpSpPr/>
+        <p:nvPr/>
+      </p:nvGrpSpPr>
+      <p:grpSpPr>
+        <a:xfrm>
+          <a:off x="0" y="0"/>
+          <a:ext cx="0" cy="0"/>
+          <a:chOff x="0" y="0"/>
+          <a:chExt cx="0" cy="0"/>
+        </a:xfrm>
+      </p:grpSpPr>
+      <p:sp>
+        <p:nvSpPr>
+          <p:cNvPr id="168" name="CustomShape 1"/>
+          <p:cNvSpPr/>
+          <p:nvPr/>
+        </p:nvSpPr>
+        <p:spPr>
+          <a:xfrm>
+            <a:off x="720000" y="300960"/>
+            <a:ext cx="8852400" cy="1259280"/>
+          </a:xfrm>
+          <a:prstGeom prst="rect">
+            <a:avLst/>
+          </a:prstGeom>
+          <a:noFill/>
+          <a:ln>
+            <a:noFill/>
+          </a:ln>
+        </p:spPr>
+        <p:style>
+          <a:lnRef idx="0"/>
+          <a:fillRef idx="0"/>
+          <a:effectRef idx="0"/>
+          <a:fontRef idx="minor"/>
+        </p:style>
+        <p:txBody>
+          <a:bodyPr lIns="0" rIns="0" tIns="0" bIns="0" anchor="ctr"/>
+          <a:p>
+            <a:pPr>
+              <a:lnSpc>
+                <a:spcPct val="100000"/>
+              </a:lnSpc>
+            </a:pPr>
+            <a:r>
+              <a:rPr b="1" lang="en-SG" sz="4400" spc="-1" strike="noStrike">
+                <a:solidFill>
+                  <a:srgbClr val="333333"/>
+                </a:solidFill>
+                <a:latin typeface="Noto Sans Regular"/>
+                <a:ea typeface="DejaVu Sans"/>
+              </a:rPr>
+              <a:t>SOLID</a:t>
+            </a:r>
+            <a:endParaRPr b="0" lang="en-SG" sz="4400" spc="-1" strike="noStrike">
+              <a:latin typeface="Arial"/>
+            </a:endParaRPr>
+          </a:p>
+        </p:txBody>
+      </p:sp>
+      <p:sp>
+        <p:nvSpPr>
+          <p:cNvPr id="169" name="CustomShape 2"/>
+          <p:cNvSpPr/>
+          <p:nvPr/>
+        </p:nvSpPr>
+        <p:spPr>
+          <a:xfrm>
+            <a:off x="720000" y="2160000"/>
+            <a:ext cx="8636760" cy="4381560"/>
+          </a:xfrm>
+          <a:prstGeom prst="rect">
+            <a:avLst/>
+          </a:prstGeom>
+          <a:noFill/>
+          <a:ln>
+            <a:noFill/>
+          </a:ln>
+        </p:spPr>
+        <p:style>
+          <a:lnRef idx="0"/>
+          <a:fillRef idx="0"/>
+          <a:effectRef idx="0"/>
+          <a:fontRef idx="minor"/>
+        </p:style>
+        <p:txBody>
+          <a:bodyPr lIns="0" rIns="0" tIns="0" bIns="0"/>
+          <a:p>
+            <a:pPr marL="432000" indent="-320760">
+              <a:lnSpc>
+                <a:spcPct val="100000"/>
+              </a:lnSpc>
+              <a:spcBef>
+                <a:spcPts val="1417"/>
+              </a:spcBef>
+              <a:buClr>
+                <a:srgbClr val="ef2929"/>
+              </a:buClr>
+              <a:buSzPct val="45000"/>
+              <a:buFont typeface="Wingdings" charset="2"/>
+              <a:buChar char=""/>
+            </a:pPr>
+            <a:r>
+              <a:rPr b="0" lang="en-SG" sz="2000" spc="-1" strike="noStrike">
+                <a:solidFill>
+                  <a:srgbClr val="333333"/>
+                </a:solidFill>
+                <a:latin typeface="Noto Sans Regular"/>
+                <a:ea typeface="DejaVu Sans"/>
+              </a:rPr>
+              <a:t>Dependency Injection Principle</a:t>
+            </a:r>
+            <a:endParaRPr b="0" lang="en-SG" sz="2000" spc="-1" strike="noStrike">
+              <a:latin typeface="Arial"/>
+            </a:endParaRPr>
+          </a:p>
+          <a:p>
+            <a:pPr marL="432000" indent="-320760">
+              <a:lnSpc>
+                <a:spcPct val="100000"/>
+              </a:lnSpc>
+              <a:spcBef>
+                <a:spcPts val="1417"/>
+              </a:spcBef>
+              <a:buClr>
+                <a:srgbClr val="ef2929"/>
+              </a:buClr>
+              <a:buSzPct val="45000"/>
+              <a:buFont typeface="Wingdings" charset="2"/>
+              <a:buChar char=""/>
+            </a:pPr>
+            <a:r>
+              <a:rPr b="0" lang="en-SG" sz="2000" spc="-1" strike="noStrike">
+                <a:solidFill>
+                  <a:srgbClr val="333333"/>
+                </a:solidFill>
+                <a:latin typeface="Noto Sans Regular"/>
+                <a:ea typeface="DejaVu Sans"/>
+              </a:rPr>
+              <a:t>High-level modules should not depend on low-level modules. Both should depend on abstractions.</a:t>
+            </a:r>
+            <a:endParaRPr b="0" lang="en-SG" sz="2000" spc="-1" strike="noStrike">
+              <a:latin typeface="Arial"/>
+            </a:endParaRPr>
+          </a:p>
+          <a:p>
+            <a:pPr marL="432000" indent="-320760">
+              <a:lnSpc>
+                <a:spcPct val="100000"/>
+              </a:lnSpc>
+              <a:spcBef>
+                <a:spcPts val="1417"/>
+              </a:spcBef>
+              <a:buClr>
+                <a:srgbClr val="ef2929"/>
+              </a:buClr>
+              <a:buSzPct val="45000"/>
+              <a:buFont typeface="Wingdings" charset="2"/>
+              <a:buChar char=""/>
+            </a:pPr>
+            <a:r>
+              <a:rPr b="0" lang="en-SG" sz="2000" spc="-1" strike="noStrike">
+                <a:solidFill>
+                  <a:srgbClr val="333333"/>
+                </a:solidFill>
+                <a:latin typeface="Noto Sans Regular"/>
+                <a:ea typeface="DejaVu Sans"/>
+              </a:rPr>
+              <a:t>Abstractions should not depend on details. Details should depend on abstractions.</a:t>
+            </a:r>
+            <a:endParaRPr b="0" lang="en-SG" sz="2000" spc="-1" strike="noStrike">
+              <a:latin typeface="Arial"/>
+            </a:endParaRPr>
+          </a:p>
+          <a:p>
+            <a:pPr marL="432000" indent="-320760">
+              <a:lnSpc>
+                <a:spcPct val="100000"/>
+              </a:lnSpc>
+              <a:spcBef>
+                <a:spcPts val="1417"/>
+              </a:spcBef>
+              <a:buClr>
+                <a:srgbClr val="ef2929"/>
+              </a:buClr>
+              <a:buSzPct val="45000"/>
+              <a:buFont typeface="Wingdings" charset="2"/>
+              <a:buChar char=""/>
+            </a:pPr>
+            <a:r>
+              <a:rPr b="0" lang="en-SG" sz="2000" spc="-1" strike="noStrike">
+                <a:solidFill>
+                  <a:srgbClr val="333333"/>
+                </a:solidFill>
+                <a:latin typeface="Noto Sans Regular"/>
+                <a:ea typeface="DejaVu Sans"/>
+              </a:rPr>
+              <a:t>Naively:</a:t>
+            </a:r>
+            <a:endParaRPr b="0" lang="en-SG" sz="2000" spc="-1" strike="noStrike">
+              <a:latin typeface="Arial"/>
+            </a:endParaRPr>
+          </a:p>
+          <a:p>
+            <a:pPr lvl="1" marL="432000" indent="-214920">
+              <a:lnSpc>
+                <a:spcPct val="100000"/>
+              </a:lnSpc>
+              <a:spcBef>
+                <a:spcPts val="1417"/>
+              </a:spcBef>
+              <a:buClr>
+                <a:srgbClr val="000000"/>
+              </a:buClr>
+              <a:buSzPct val="45000"/>
+              <a:buFont typeface="Wingdings" charset="2"/>
+              <a:buChar char=""/>
+            </a:pPr>
+            <a:r>
+              <a:rPr b="0" lang="en-SG" sz="2000" spc="-1" strike="noStrike">
+                <a:solidFill>
+                  <a:srgbClr val="333333"/>
+                </a:solidFill>
+                <a:latin typeface="Noto Sans Regular"/>
+                <a:ea typeface="DejaVu Sans"/>
+              </a:rPr>
+              <a:t>No variable should hold a reference to a concrete class.</a:t>
+            </a:r>
+            <a:endParaRPr b="0" lang="en-SG" sz="2000" spc="-1" strike="noStrike">
+              <a:latin typeface="Arial"/>
+            </a:endParaRPr>
+          </a:p>
+          <a:p>
+            <a:pPr lvl="1" marL="432000" indent="-214920">
+              <a:lnSpc>
+                <a:spcPct val="100000"/>
+              </a:lnSpc>
+              <a:spcBef>
+                <a:spcPts val="1417"/>
+              </a:spcBef>
+              <a:buClr>
+                <a:srgbClr val="000000"/>
+              </a:buClr>
+              <a:buSzPct val="45000"/>
+              <a:buFont typeface="Wingdings" charset="2"/>
+              <a:buChar char=""/>
+            </a:pPr>
+            <a:r>
+              <a:rPr b="0" lang="en-SG" sz="2000" spc="-1" strike="noStrike">
+                <a:solidFill>
+                  <a:srgbClr val="333333"/>
+                </a:solidFill>
+                <a:latin typeface="Noto Sans Regular"/>
+                <a:ea typeface="DejaVu Sans"/>
+              </a:rPr>
+              <a:t>No class should derive from a concrete class.</a:t>
+            </a:r>
+            <a:endParaRPr b="0" lang="en-SG" sz="2000" spc="-1" strike="noStrike">
+              <a:latin typeface="Arial"/>
+            </a:endParaRPr>
+          </a:p>
+          <a:p>
+            <a:pPr lvl="1" marL="432000" indent="-214920">
+              <a:lnSpc>
+                <a:spcPct val="100000"/>
+              </a:lnSpc>
+              <a:spcBef>
+                <a:spcPts val="1417"/>
+              </a:spcBef>
+              <a:buClr>
+                <a:srgbClr val="000000"/>
+              </a:buClr>
+              <a:buSzPct val="45000"/>
+              <a:buFont typeface="Wingdings" charset="2"/>
+              <a:buChar char=""/>
+            </a:pPr>
+            <a:r>
+              <a:rPr b="0" lang="en-SG" sz="2000" spc="-1" strike="noStrike">
+                <a:solidFill>
+                  <a:srgbClr val="333333"/>
+                </a:solidFill>
+                <a:latin typeface="Noto Sans Regular"/>
+                <a:ea typeface="DejaVu Sans"/>
+              </a:rPr>
+              <a:t>No method should override an implemented method of any of its base classes.</a:t>
+            </a:r>
+            <a:endParaRPr b="0" lang="en-SG" sz="2000" spc="-1" strike="noStrike">
+              <a:latin typeface="Arial"/>
+            </a:endParaRPr>
+          </a:p>
+          <a:p>
+            <a:pPr>
+              <a:lnSpc>
+                <a:spcPct val="100000"/>
+              </a:lnSpc>
+              <a:spcBef>
+                <a:spcPts val="1417"/>
+              </a:spcBef>
+            </a:pPr>
+            <a:endParaRPr b="0" lang="en-SG" sz="2000" spc="-1" strike="noStrike">
+              <a:latin typeface="Arial"/>
+            </a:endParaRPr>
+          </a:p>
+          <a:p>
+            <a:pPr>
+              <a:lnSpc>
+                <a:spcPct val="100000"/>
+              </a:lnSpc>
+              <a:spcAft>
+                <a:spcPts val="1414"/>
+              </a:spcAft>
+            </a:pPr>
+            <a:endParaRPr b="0" lang="en-SG" sz="2000" spc="-1" strike="noStrike">
+              <a:latin typeface="Arial"/>
+            </a:endParaRPr>
+          </a:p>
+        </p:txBody>
+      </p:sp>
+    </p:spTree>
+  </p:cSld>
+  <p:timing>
+    <p:tnLst>
+      <p:par>
+        <p:cTn id="61" dur="indefinite" restart="never" nodeType="tmRoot">
+          <p:childTnLst>
+            <p:seq>
+              <p:cTn id="62" dur="indefinite" nodeType="mainSeq"/>
+              <p:prevCondLst>
+                <p:cond delay="0" evt="onPrev">
+                  <p:tgtEl>
+                    <p:sldTgt/>
+                  </p:tgtEl>
+                </p:cond>
+              </p:prevCondLst>
+              <p:nextCondLst>
+                <p:cond delay="0" evt="onNext">
+                  <p:tgtEl>
+                    <p:sldTgt/>
+                  </p:tgtEl>
+                </p:cond>
+              </p:nextCondLst>
+            </p:seq>
+          </p:childTnLst>
+        </p:cTn>
+      </p:par>
+    </p:tnLst>
+  </p:timing>
+</p:sld>
+</file>
+
+<file path=ppt/slides/slide32.xml><?xml version="1.0" encoding="utf-8"?>
+<p:sld xmlns:a="http://schemas.openxmlformats.org/drawingml/2006/main" xmlns:p="http://schemas.openxmlformats.org/presentationml/2006/main" xmlns:r="http://schemas.openxmlformats.org/officeDocument/2006/relationships" xmlns:p14="http://schemas.microsoft.com/office/powerpoint/2010/main" xmlns:p15="http://schemas.microsoft.com/office/powerpoint/2012/main" xmlns:mc="http://schemas.openxmlformats.org/markup-compatibility/2006">
+  <p:cSld>
+    <p:spTree>
+      <p:nvGrpSpPr>
+        <p:cNvPr id="1" name=""/>
+        <p:cNvGrpSpPr/>
+        <p:nvPr/>
+      </p:nvGrpSpPr>
+      <p:grpSpPr>
+        <a:xfrm>
+          <a:off x="0" y="0"/>
+          <a:ext cx="0" cy="0"/>
+          <a:chOff x="0" y="0"/>
+          <a:chExt cx="0" cy="0"/>
+        </a:xfrm>
+      </p:grpSpPr>
+      <p:sp>
+        <p:nvSpPr>
+          <p:cNvPr id="170" name="CustomShape 1"/>
+          <p:cNvSpPr/>
+          <p:nvPr/>
+        </p:nvSpPr>
+        <p:spPr>
+          <a:xfrm>
+            <a:off x="720000" y="300960"/>
+            <a:ext cx="8852400" cy="1259280"/>
+          </a:xfrm>
+          <a:prstGeom prst="rect">
+            <a:avLst/>
+          </a:prstGeom>
+          <a:noFill/>
+          <a:ln>
+            <a:noFill/>
+          </a:ln>
+        </p:spPr>
+        <p:style>
+          <a:lnRef idx="0"/>
+          <a:fillRef idx="0"/>
+          <a:effectRef idx="0"/>
+          <a:fontRef idx="minor"/>
+        </p:style>
+        <p:txBody>
+          <a:bodyPr lIns="0" rIns="0" tIns="0" bIns="0" anchor="ctr"/>
+          <a:p>
+            <a:pPr>
+              <a:lnSpc>
+                <a:spcPct val="100000"/>
+              </a:lnSpc>
+            </a:pPr>
+            <a:br/>
+            <a:r>
+              <a:rPr b="1" lang="en-SG" sz="4400" spc="-1" strike="noStrike">
+                <a:solidFill>
+                  <a:srgbClr val="333333"/>
+                </a:solidFill>
+                <a:latin typeface="Noto Sans Regular"/>
+                <a:ea typeface="DejaVu Sans"/>
+              </a:rPr>
+              <a:t>References</a:t>
+            </a:r>
+            <a:endParaRPr b="0" lang="en-SG" sz="4400" spc="-1" strike="noStrike">
+              <a:latin typeface="Arial"/>
+            </a:endParaRPr>
+          </a:p>
+        </p:txBody>
+      </p:sp>
+      <p:sp>
+        <p:nvSpPr>
+          <p:cNvPr id="171" name="CustomShape 2"/>
+          <p:cNvSpPr/>
+          <p:nvPr/>
+        </p:nvSpPr>
+        <p:spPr>
+          <a:xfrm>
+            <a:off x="720000" y="2160000"/>
+            <a:ext cx="8636760" cy="4381560"/>
+          </a:xfrm>
+          <a:prstGeom prst="rect">
+            <a:avLst/>
+          </a:prstGeom>
+          <a:noFill/>
+          <a:ln>
+            <a:noFill/>
+          </a:ln>
+        </p:spPr>
+        <p:style>
+          <a:lnRef idx="0"/>
+          <a:fillRef idx="0"/>
+          <a:effectRef idx="0"/>
+          <a:fontRef idx="minor"/>
+        </p:style>
+        <p:txBody>
+          <a:bodyPr lIns="0" rIns="0" tIns="0" bIns="0"/>
+          <a:p>
+            <a:pPr marL="432000" indent="-320760">
+              <a:lnSpc>
+                <a:spcPct val="100000"/>
+              </a:lnSpc>
+              <a:spcBef>
+                <a:spcPts val="1417"/>
+              </a:spcBef>
+              <a:buClr>
+                <a:srgbClr val="ef2929"/>
+              </a:buClr>
+              <a:buSzPct val="45000"/>
+              <a:buFont typeface="Wingdings" charset="2"/>
+              <a:buChar char=""/>
+            </a:pPr>
+            <a:r>
+              <a:rPr b="0" lang="en-SG" sz="2000" spc="-1" strike="noStrike">
+                <a:solidFill>
+                  <a:srgbClr val="333333"/>
+                </a:solidFill>
+                <a:latin typeface="Noto Sans Regular"/>
+                <a:ea typeface="DejaVu Sans"/>
+              </a:rPr>
+              <a:t>University of Wisconsin, CSE 403 materials</a:t>
+            </a:r>
+            <a:endParaRPr b="0" lang="en-SG" sz="2000" spc="-1" strike="noStrike">
+              <a:latin typeface="Arial"/>
+            </a:endParaRPr>
+          </a:p>
+          <a:p>
+            <a:pPr>
+              <a:lnSpc>
+                <a:spcPct val="100000"/>
+              </a:lnSpc>
+              <a:spcBef>
+                <a:spcPts val="1417"/>
+              </a:spcBef>
+            </a:pPr>
+            <a:r>
+              <a:rPr b="0" lang="en-SG" sz="2000" spc="-1" strike="noStrike" u="sng">
+                <a:solidFill>
+                  <a:srgbClr val="0000ff"/>
+                </a:solidFill>
+                <a:uFillTx/>
+                <a:latin typeface="Noto Sans Regular"/>
+                <a:ea typeface="DejaVu Sans"/>
+                <a:hlinkClick r:id="rId1"/>
+              </a:rPr>
+              <a:t>https://courses.cs.washington.edu/courses/cse403/11sp/lectures/</a:t>
+            </a:r>
+            <a:endParaRPr b="0" lang="en-SG" sz="2000" spc="-1" strike="noStrike">
+              <a:latin typeface="Arial"/>
+            </a:endParaRPr>
+          </a:p>
+          <a:p>
+            <a:pPr marL="432000" indent="-320760">
+              <a:lnSpc>
+                <a:spcPct val="100000"/>
+              </a:lnSpc>
+              <a:spcBef>
+                <a:spcPts val="1417"/>
+              </a:spcBef>
+              <a:buClr>
+                <a:srgbClr val="ef2929"/>
+              </a:buClr>
+              <a:buSzPct val="45000"/>
+              <a:buFont typeface="Wingdings" charset="2"/>
+              <a:buChar char=""/>
+            </a:pPr>
+            <a:r>
+              <a:rPr b="0" lang="en-SG" sz="2000" spc="-1" strike="noStrike">
+                <a:solidFill>
+                  <a:srgbClr val="333333"/>
+                </a:solidFill>
+                <a:latin typeface="Noto Sans Regular"/>
+                <a:ea typeface="DejaVu Sans"/>
+              </a:rPr>
+              <a:t>Blackboard system/Architecture</a:t>
+            </a:r>
+            <a:endParaRPr b="0" lang="en-SG" sz="2000" spc="-1" strike="noStrike">
+              <a:latin typeface="Arial"/>
+            </a:endParaRPr>
+          </a:p>
+          <a:p>
+            <a:pPr marL="432000" indent="-320760">
+              <a:lnSpc>
+                <a:spcPct val="100000"/>
+              </a:lnSpc>
+              <a:spcBef>
+                <a:spcPts val="1417"/>
+              </a:spcBef>
+              <a:buClr>
+                <a:srgbClr val="ef2929"/>
+              </a:buClr>
+              <a:buSzPct val="45000"/>
+              <a:buFont typeface="Wingdings" charset="2"/>
+              <a:buChar char=""/>
+            </a:pPr>
+            <a:r>
+              <a:rPr b="0" lang="en-SG" sz="2000" spc="-1" strike="noStrike">
+                <a:solidFill>
+                  <a:srgbClr val="333333"/>
+                </a:solidFill>
+                <a:latin typeface="Noto Sans Regular"/>
+                <a:ea typeface="DejaVu Sans"/>
+              </a:rPr>
+              <a:t>https://en.wikipedia.org/wiki/Blackboard_system</a:t>
+            </a:r>
+            <a:endParaRPr b="0" lang="en-SG" sz="2000" spc="-1" strike="noStrike">
+              <a:latin typeface="Arial"/>
+            </a:endParaRPr>
+          </a:p>
+          <a:p>
+            <a:pPr>
+              <a:lnSpc>
+                <a:spcPct val="100000"/>
+              </a:lnSpc>
+              <a:spcBef>
+                <a:spcPts val="1417"/>
+              </a:spcBef>
+            </a:pPr>
+            <a:endParaRPr b="0" lang="en-SG" sz="2000" spc="-1" strike="noStrike">
+              <a:latin typeface="Arial"/>
+            </a:endParaRPr>
+          </a:p>
+          <a:p>
+            <a:pPr>
+              <a:lnSpc>
+                <a:spcPct val="100000"/>
+              </a:lnSpc>
+              <a:spcBef>
+                <a:spcPts val="1417"/>
+              </a:spcBef>
+            </a:pPr>
+            <a:endParaRPr b="0" lang="en-SG" sz="2000" spc="-1" strike="noStrike">
+              <a:latin typeface="Arial"/>
+            </a:endParaRPr>
+          </a:p>
+          <a:p>
+            <a:pPr>
+              <a:lnSpc>
+                <a:spcPct val="100000"/>
+              </a:lnSpc>
+              <a:spcAft>
+                <a:spcPts val="1414"/>
+              </a:spcAft>
+            </a:pPr>
+            <a:endParaRPr b="0" lang="en-SG" sz="2000" spc="-1" strike="noStrike">
+              <a:latin typeface="Arial"/>
+            </a:endParaRPr>
+          </a:p>
+        </p:txBody>
+      </p:sp>
+      <p:sp>
+        <p:nvSpPr>
+          <p:cNvPr id="172" name="CustomShape 3"/>
+          <p:cNvSpPr/>
+          <p:nvPr/>
+        </p:nvSpPr>
+        <p:spPr>
+          <a:xfrm>
+            <a:off x="465480" y="7040880"/>
+            <a:ext cx="5749200" cy="343440"/>
+          </a:xfrm>
+          <a:prstGeom prst="rect">
+            <a:avLst/>
+          </a:prstGeom>
+          <a:noFill/>
+          <a:ln>
+            <a:noFill/>
+          </a:ln>
+        </p:spPr>
+        <p:style>
+          <a:lnRef idx="0"/>
+          <a:fillRef idx="0"/>
+          <a:effectRef idx="0"/>
+          <a:fontRef idx="minor"/>
+        </p:style>
+        <p:txBody>
+          <a:bodyPr lIns="90000" rIns="90000" tIns="45000" bIns="45000"/>
+          <a:p>
+            <a:pPr>
+              <a:lnSpc>
+                <a:spcPct val="100000"/>
+              </a:lnSpc>
+            </a:pPr>
+            <a:r>
+              <a:rPr b="0" lang="en-SG" sz="1300" spc="-1" strike="noStrike">
+                <a:solidFill>
+                  <a:srgbClr val="000000"/>
+                </a:solidFill>
+                <a:latin typeface="Arial"/>
+                <a:ea typeface="DejaVu Sans"/>
+              </a:rPr>
+              <a:t>https://www.geeksforgeeks.org/introduction-to-net-framework/</a:t>
+            </a:r>
+            <a:endParaRPr b="0" lang="en-SG" sz="1300" spc="-1" strike="noStrike">
+              <a:latin typeface="Arial"/>
+            </a:endParaRPr>
+          </a:p>
+        </p:txBody>
+      </p:sp>
+    </p:spTree>
+  </p:cSld>
+  <p:timing>
+    <p:tnLst>
+      <p:par>
+        <p:cTn id="63" dur="indefinite" restart="never" nodeType="tmRoot">
+          <p:childTnLst>
+            <p:seq>
+              <p:cTn id="64" dur="indefinite" nodeType="mainSeq"/>
               <p:prevCondLst>
                 <p:cond delay="0" evt="onPrev">
                   <p:tgtEl>
@@ -8765,7 +10180,7 @@
         <p:spPr>
           <a:xfrm>
             <a:off x="720000" y="300960"/>
-            <a:ext cx="8852760" cy="1259640"/>
+            <a:ext cx="8852400" cy="1259280"/>
           </a:xfrm>
           <a:prstGeom prst="rect">
             <a:avLst/>
@@ -8814,7 +10229,7 @@
         <p:spPr>
           <a:xfrm>
             <a:off x="720000" y="2160000"/>
-            <a:ext cx="8637120" cy="4381920"/>
+            <a:ext cx="8636760" cy="4381560"/>
           </a:xfrm>
           <a:prstGeom prst="rect">
             <a:avLst/>
@@ -8833,7 +10248,7 @@
         <p:txBody>
           <a:bodyPr lIns="0" rIns="0" tIns="0" bIns="0"/>
           <a:p>
-            <a:pPr marL="432000" indent="-321120">
+            <a:pPr marL="432000" indent="-320760">
               <a:lnSpc>
                 <a:spcPct val="100000"/>
               </a:lnSpc>
@@ -8862,7 +10277,7 @@
             </a:endParaRPr>
           </a:p>
           <a:p>
-            <a:pPr lvl="1" marL="432000" indent="-216000">
+            <a:pPr lvl="1" marL="432000" indent="-215640">
               <a:lnSpc>
                 <a:spcPct val="100000"/>
               </a:lnSpc>
@@ -8891,7 +10306,7 @@
             </a:endParaRPr>
           </a:p>
           <a:p>
-            <a:pPr lvl="1" marL="432000" indent="-216000">
+            <a:pPr lvl="1" marL="432000" indent="-215640">
               <a:lnSpc>
                 <a:spcPct val="100000"/>
               </a:lnSpc>
@@ -8920,7 +10335,7 @@
             </a:endParaRPr>
           </a:p>
           <a:p>
-            <a:pPr lvl="1" marL="432000" indent="-216000">
+            <a:pPr lvl="1" marL="432000" indent="-215640">
               <a:lnSpc>
                 <a:spcPct val="100000"/>
               </a:lnSpc>
@@ -8949,7 +10364,7 @@
             </a:endParaRPr>
           </a:p>
           <a:p>
-            <a:pPr lvl="1" marL="432000" indent="-216000">
+            <a:pPr lvl="1" marL="432000" indent="-215640">
               <a:lnSpc>
                 <a:spcPct val="100000"/>
               </a:lnSpc>
@@ -8978,7 +10393,7 @@
             </a:endParaRPr>
           </a:p>
           <a:p>
-            <a:pPr lvl="1" marL="432000" indent="-216000">
+            <a:pPr lvl="1" marL="432000" indent="-215640">
               <a:lnSpc>
                 <a:spcPct val="100000"/>
               </a:lnSpc>
@@ -9043,7 +10458,7 @@
         <p:spPr>
           <a:xfrm>
             <a:off x="465480" y="7040880"/>
-            <a:ext cx="5749560" cy="343800"/>
+            <a:ext cx="5749200" cy="343440"/>
           </a:xfrm>
           <a:prstGeom prst="rect">
             <a:avLst/>
@@ -9118,7 +10533,7 @@
         <p:spPr>
           <a:xfrm>
             <a:off x="720000" y="300960"/>
-            <a:ext cx="8852760" cy="1259640"/>
+            <a:ext cx="8852400" cy="1259280"/>
           </a:xfrm>
           <a:prstGeom prst="rect">
             <a:avLst/>
@@ -9167,7 +10582,7 @@
         <p:spPr>
           <a:xfrm>
             <a:off x="720000" y="2160000"/>
-            <a:ext cx="8637120" cy="4381920"/>
+            <a:ext cx="8636760" cy="4381560"/>
           </a:xfrm>
           <a:prstGeom prst="rect">
             <a:avLst/>
@@ -9186,19 +10601,13 @@
         <p:txBody>
           <a:bodyPr lIns="0" rIns="0" tIns="0" bIns="0"/>
           <a:p>
-            <a:pPr marL="432000" indent="-321120">
+            <a:pPr>
               <a:lnSpc>
                 <a:spcPct val="100000"/>
               </a:lnSpc>
               <a:spcBef>
                 <a:spcPts val="1417"/>
               </a:spcBef>
-              <a:buClr>
-                <a:srgbClr val="ef2929"/>
-              </a:buClr>
-              <a:buSzPct val="45000"/>
-              <a:buFont typeface="Wingdings" charset="2"/>
-              <a:buChar char=""/>
             </a:pPr>
             <a:endParaRPr b="0" lang="en-SG" sz="1800" spc="-1" strike="noStrike">
               <a:latin typeface="Arial"/>
@@ -9241,7 +10650,7 @@
         <p:spPr>
           <a:xfrm>
             <a:off x="465480" y="7040880"/>
-            <a:ext cx="5749560" cy="343800"/>
+            <a:ext cx="5749200" cy="343440"/>
           </a:xfrm>
           <a:prstGeom prst="rect">
             <a:avLst/>
@@ -9271,7 +10680,7 @@
         <p:spPr>
           <a:xfrm>
             <a:off x="822960" y="1818000"/>
-            <a:ext cx="7016400" cy="5131440"/>
+            <a:ext cx="7016040" cy="5131080"/>
           </a:xfrm>
           <a:prstGeom prst="rect">
             <a:avLst/>
@@ -9339,7 +10748,7 @@
         <p:spPr>
           <a:xfrm>
             <a:off x="720000" y="300960"/>
-            <a:ext cx="8852760" cy="1259640"/>
+            <a:ext cx="8852400" cy="1259280"/>
           </a:xfrm>
           <a:prstGeom prst="rect">
             <a:avLst/>
@@ -9388,7 +10797,7 @@
         <p:spPr>
           <a:xfrm>
             <a:off x="720000" y="2160000"/>
-            <a:ext cx="8637120" cy="4381920"/>
+            <a:ext cx="8636760" cy="4381560"/>
           </a:xfrm>
           <a:prstGeom prst="rect">
             <a:avLst/>
@@ -9407,19 +10816,13 @@
         <p:txBody>
           <a:bodyPr lIns="0" rIns="0" tIns="0" bIns="0"/>
           <a:p>
-            <a:pPr marL="432000" indent="-321120">
+            <a:pPr>
               <a:lnSpc>
                 <a:spcPct val="100000"/>
               </a:lnSpc>
               <a:spcBef>
                 <a:spcPts val="1417"/>
               </a:spcBef>
-              <a:buClr>
-                <a:srgbClr val="ef2929"/>
-              </a:buClr>
-              <a:buSzPct val="45000"/>
-              <a:buFont typeface="Wingdings" charset="2"/>
-              <a:buChar char=""/>
             </a:pPr>
             <a:endParaRPr b="0" lang="en-SG" sz="1800" spc="-1" strike="noStrike">
               <a:latin typeface="Arial"/>
@@ -9462,7 +10865,7 @@
         <p:spPr>
           <a:xfrm>
             <a:off x="465480" y="7040880"/>
-            <a:ext cx="5749560" cy="343800"/>
+            <a:ext cx="5749200" cy="343440"/>
           </a:xfrm>
           <a:prstGeom prst="rect">
             <a:avLst/>
@@ -9492,7 +10895,7 @@
         <p:spPr>
           <a:xfrm>
             <a:off x="345240" y="1828800"/>
-            <a:ext cx="7701480" cy="5029200"/>
+            <a:ext cx="7701120" cy="5028840"/>
           </a:xfrm>
           <a:prstGeom prst="rect">
             <a:avLst/>
@@ -9560,7 +10963,7 @@
         <p:spPr>
           <a:xfrm>
             <a:off x="720000" y="300960"/>
-            <a:ext cx="8852760" cy="1259640"/>
+            <a:ext cx="8852400" cy="1259280"/>
           </a:xfrm>
           <a:prstGeom prst="rect">
             <a:avLst/>
@@ -9609,7 +11012,7 @@
         <p:spPr>
           <a:xfrm>
             <a:off x="720000" y="2160000"/>
-            <a:ext cx="8637120" cy="4381920"/>
+            <a:ext cx="8636760" cy="4381560"/>
           </a:xfrm>
           <a:prstGeom prst="rect">
             <a:avLst/>
@@ -9628,19 +11031,13 @@
         <p:txBody>
           <a:bodyPr lIns="0" rIns="0" tIns="0" bIns="0"/>
           <a:p>
-            <a:pPr marL="432000" indent="-321120">
+            <a:pPr>
               <a:lnSpc>
                 <a:spcPct val="100000"/>
               </a:lnSpc>
               <a:spcBef>
                 <a:spcPts val="1417"/>
               </a:spcBef>
-              <a:buClr>
-                <a:srgbClr val="ef2929"/>
-              </a:buClr>
-              <a:buSzPct val="45000"/>
-              <a:buFont typeface="Wingdings" charset="2"/>
-              <a:buChar char=""/>
             </a:pPr>
             <a:endParaRPr b="0" lang="en-SG" sz="1800" spc="-1" strike="noStrike">
               <a:latin typeface="Arial"/>
@@ -9683,7 +11080,7 @@
         <p:spPr>
           <a:xfrm>
             <a:off x="465480" y="7040880"/>
-            <a:ext cx="5749560" cy="343800"/>
+            <a:ext cx="5749200" cy="343440"/>
           </a:xfrm>
           <a:prstGeom prst="rect">
             <a:avLst/>
@@ -9713,7 +11110,7 @@
         <p:spPr>
           <a:xfrm>
             <a:off x="346680" y="2011680"/>
-            <a:ext cx="9620280" cy="4753080"/>
+            <a:ext cx="9619920" cy="4752720"/>
           </a:xfrm>
           <a:prstGeom prst="rect">
             <a:avLst/>
@@ -9781,7 +11178,7 @@
         <p:spPr>
           <a:xfrm>
             <a:off x="792000" y="3993480"/>
-            <a:ext cx="8565120" cy="1658520"/>
+            <a:ext cx="8564760" cy="1658160"/>
           </a:xfrm>
           <a:prstGeom prst="rect">
             <a:avLst/>
@@ -9872,7 +11269,7 @@
         <p:spPr>
           <a:xfrm>
             <a:off x="792000" y="5904000"/>
-            <a:ext cx="8565120" cy="979560"/>
+            <a:ext cx="8564760" cy="979200"/>
           </a:xfrm>
           <a:prstGeom prst="rect">
             <a:avLst/>
@@ -9947,7 +11344,7 @@
         <p:spPr>
           <a:xfrm>
             <a:off x="792000" y="3993480"/>
-            <a:ext cx="8565120" cy="1658520"/>
+            <a:ext cx="8564760" cy="1658160"/>
           </a:xfrm>
           <a:prstGeom prst="rect">
             <a:avLst/>
@@ -9998,7 +11395,7 @@
         <p:spPr>
           <a:xfrm>
             <a:off x="792000" y="5904000"/>
-            <a:ext cx="8565120" cy="979560"/>
+            <a:ext cx="8564760" cy="979200"/>
           </a:xfrm>
           <a:prstGeom prst="rect">
             <a:avLst/>

</xml_diff>